<commit_message>
update mysql table plans
</commit_message>
<xml_diff>
--- a/READUS/reminder-web-er.pptx
+++ b/READUS/reminder-web-er.pptx
@@ -211,7 +211,7 @@
           <a:p>
             <a:fld id="{5ADA11A1-5AD6-489A-9144-FC3497B7B873}" type="datetimeFigureOut">
               <a:rPr lang="ko-KR" altLang="en-US" smtClean="0"/>
-              <a:t>2025-11-22</a:t>
+              <a:t>2025-11-25</a:t>
             </a:fld>
             <a:endParaRPr lang="ko-KR" altLang="en-US"/>
           </a:p>
@@ -745,7 +745,7 @@
             <a:fld id="{D3633D0A-AEB7-4A32-B80E-995D605C0F6A}" type="datetimeFigureOut">
               <a:rPr lang="ko-KR" altLang="en-US" smtClean="0"/>
               <a:pPr/>
-              <a:t>2025-11-22</a:t>
+              <a:t>2025-11-25</a:t>
             </a:fld>
             <a:endParaRPr lang="ko-KR" altLang="en-US"/>
           </a:p>
@@ -912,7 +912,7 @@
             <a:fld id="{D3633D0A-AEB7-4A32-B80E-995D605C0F6A}" type="datetimeFigureOut">
               <a:rPr lang="ko-KR" altLang="en-US" smtClean="0"/>
               <a:pPr/>
-              <a:t>2025-11-22</a:t>
+              <a:t>2025-11-25</a:t>
             </a:fld>
             <a:endParaRPr lang="ko-KR" altLang="en-US"/>
           </a:p>
@@ -1089,7 +1089,7 @@
             <a:fld id="{D3633D0A-AEB7-4A32-B80E-995D605C0F6A}" type="datetimeFigureOut">
               <a:rPr lang="ko-KR" altLang="en-US" smtClean="0"/>
               <a:pPr/>
-              <a:t>2025-11-22</a:t>
+              <a:t>2025-11-25</a:t>
             </a:fld>
             <a:endParaRPr lang="ko-KR" altLang="en-US"/>
           </a:p>
@@ -1256,7 +1256,7 @@
             <a:fld id="{D3633D0A-AEB7-4A32-B80E-995D605C0F6A}" type="datetimeFigureOut">
               <a:rPr lang="ko-KR" altLang="en-US" smtClean="0"/>
               <a:pPr/>
-              <a:t>2025-11-22</a:t>
+              <a:t>2025-11-25</a:t>
             </a:fld>
             <a:endParaRPr lang="ko-KR" altLang="en-US"/>
           </a:p>
@@ -1499,7 +1499,7 @@
             <a:fld id="{D3633D0A-AEB7-4A32-B80E-995D605C0F6A}" type="datetimeFigureOut">
               <a:rPr lang="ko-KR" altLang="en-US" smtClean="0"/>
               <a:pPr/>
-              <a:t>2025-11-22</a:t>
+              <a:t>2025-11-25</a:t>
             </a:fld>
             <a:endParaRPr lang="ko-KR" altLang="en-US"/>
           </a:p>
@@ -1784,7 +1784,7 @@
             <a:fld id="{D3633D0A-AEB7-4A32-B80E-995D605C0F6A}" type="datetimeFigureOut">
               <a:rPr lang="ko-KR" altLang="en-US" smtClean="0"/>
               <a:pPr/>
-              <a:t>2025-11-22</a:t>
+              <a:t>2025-11-25</a:t>
             </a:fld>
             <a:endParaRPr lang="ko-KR" altLang="en-US"/>
           </a:p>
@@ -2203,7 +2203,7 @@
             <a:fld id="{D3633D0A-AEB7-4A32-B80E-995D605C0F6A}" type="datetimeFigureOut">
               <a:rPr lang="ko-KR" altLang="en-US" smtClean="0"/>
               <a:pPr/>
-              <a:t>2025-11-22</a:t>
+              <a:t>2025-11-25</a:t>
             </a:fld>
             <a:endParaRPr lang="ko-KR" altLang="en-US"/>
           </a:p>
@@ -2318,7 +2318,7 @@
             <a:fld id="{D3633D0A-AEB7-4A32-B80E-995D605C0F6A}" type="datetimeFigureOut">
               <a:rPr lang="ko-KR" altLang="en-US" smtClean="0"/>
               <a:pPr/>
-              <a:t>2025-11-22</a:t>
+              <a:t>2025-11-25</a:t>
             </a:fld>
             <a:endParaRPr lang="ko-KR" altLang="en-US"/>
           </a:p>
@@ -2410,7 +2410,7 @@
             <a:fld id="{D3633D0A-AEB7-4A32-B80E-995D605C0F6A}" type="datetimeFigureOut">
               <a:rPr lang="ko-KR" altLang="en-US" smtClean="0"/>
               <a:pPr/>
-              <a:t>2025-11-22</a:t>
+              <a:t>2025-11-25</a:t>
             </a:fld>
             <a:endParaRPr lang="ko-KR" altLang="en-US"/>
           </a:p>
@@ -2684,7 +2684,7 @@
             <a:fld id="{D3633D0A-AEB7-4A32-B80E-995D605C0F6A}" type="datetimeFigureOut">
               <a:rPr lang="ko-KR" altLang="en-US" smtClean="0"/>
               <a:pPr/>
-              <a:t>2025-11-22</a:t>
+              <a:t>2025-11-25</a:t>
             </a:fld>
             <a:endParaRPr lang="ko-KR" altLang="en-US"/>
           </a:p>
@@ -2934,7 +2934,7 @@
             <a:fld id="{D3633D0A-AEB7-4A32-B80E-995D605C0F6A}" type="datetimeFigureOut">
               <a:rPr lang="ko-KR" altLang="en-US" smtClean="0"/>
               <a:pPr/>
-              <a:t>2025-11-22</a:t>
+              <a:t>2025-11-25</a:t>
             </a:fld>
             <a:endParaRPr lang="ko-KR" altLang="en-US"/>
           </a:p>
@@ -3144,7 +3144,7 @@
             <a:fld id="{D3633D0A-AEB7-4A32-B80E-995D605C0F6A}" type="datetimeFigureOut">
               <a:rPr lang="ko-KR" altLang="en-US" smtClean="0"/>
               <a:pPr/>
-              <a:t>2025-11-22</a:t>
+              <a:t>2025-11-25</a:t>
             </a:fld>
             <a:endParaRPr lang="ko-KR" altLang="en-US"/>
           </a:p>
@@ -3523,7 +3523,7 @@
         </p:nvGrpSpPr>
         <p:grpSpPr>
           <a:xfrm>
-            <a:off x="2921795" y="2489747"/>
+            <a:off x="2386412" y="1942836"/>
             <a:ext cx="1868546" cy="4512482"/>
             <a:chOff x="2632648" y="4648872"/>
             <a:chExt cx="1656184" cy="3999632"/>
@@ -3592,6 +3592,9 @@
                   <a:solidFill>
                     <a:schemeClr val="tx1"/>
                   </a:solidFill>
+                  <a:highlight>
+                    <a:srgbClr val="00FF00"/>
+                  </a:highlight>
                 </a:rPr>
                 <a:t>user_id</a:t>
               </a:r>
@@ -3599,6 +3602,9 @@
                 <a:solidFill>
                   <a:schemeClr val="tx1"/>
                 </a:solidFill>
+                <a:highlight>
+                  <a:srgbClr val="00FF00"/>
+                </a:highlight>
               </a:endParaRPr>
             </a:p>
             <a:p>
@@ -3609,6 +3615,46 @@
                   </a:solidFill>
                 </a:rPr>
                 <a:t>name</a:t>
+              </a:r>
+            </a:p>
+            <a:p>
+              <a:r>
+                <a:rPr lang="en-US" altLang="ko-KR" sz="1200" dirty="0">
+                  <a:solidFill>
+                    <a:schemeClr val="tx1"/>
+                  </a:solidFill>
+                </a:rPr>
+                <a:t>password</a:t>
+              </a:r>
+            </a:p>
+            <a:p>
+              <a:r>
+                <a:rPr lang="en-US" altLang="ko-KR" sz="1200" dirty="0">
+                  <a:solidFill>
+                    <a:schemeClr val="tx1"/>
+                  </a:solidFill>
+                </a:rPr>
+                <a:t>salt</a:t>
+              </a:r>
+            </a:p>
+            <a:p>
+              <a:r>
+                <a:rPr lang="en-US" altLang="ko-KR" sz="1200" dirty="0">
+                  <a:solidFill>
+                    <a:schemeClr val="tx1"/>
+                  </a:solidFill>
+                </a:rPr>
+                <a:t>email</a:t>
+              </a:r>
+            </a:p>
+            <a:p>
+              <a:r>
+                <a:rPr lang="en-US" altLang="ko-KR" sz="1200" dirty="0">
+                  <a:solidFill>
+                    <a:schemeClr val="tx1"/>
+                  </a:solidFill>
+                </a:rPr>
+                <a:t>email2</a:t>
               </a:r>
             </a:p>
             <a:p>
@@ -3956,8 +4002,8 @@
         </p:nvCxnSpPr>
         <p:spPr>
           <a:xfrm flipH="1" flipV="1">
-            <a:off x="4790341" y="4908471"/>
-            <a:ext cx="3244022" cy="84947"/>
+            <a:off x="4254958" y="4361560"/>
+            <a:ext cx="3779405" cy="631858"/>
           </a:xfrm>
           <a:prstGeom prst="straightConnector1">
             <a:avLst/>
@@ -4065,6 +4111,62 @@
                 </a:solidFill>
               </a:endParaRPr>
             </a:p>
+            <a:p>
+              <a:r>
+                <a:rPr lang="en-US" altLang="ko-KR" sz="1200" dirty="0" err="1">
+                  <a:solidFill>
+                    <a:schemeClr val="tx1"/>
+                  </a:solidFill>
+                  <a:highlight>
+                    <a:srgbClr val="00FF00"/>
+                  </a:highlight>
+                </a:rPr>
+                <a:t>google_id</a:t>
+              </a:r>
+              <a:endParaRPr lang="en-US" altLang="ko-KR" sz="1200" dirty="0">
+                <a:solidFill>
+                  <a:schemeClr val="tx1"/>
+                </a:solidFill>
+                <a:highlight>
+                  <a:srgbClr val="00FF00"/>
+                </a:highlight>
+              </a:endParaRPr>
+            </a:p>
+            <a:p>
+              <a:r>
+                <a:rPr lang="en-US" altLang="ko-KR" sz="1200" dirty="0">
+                  <a:solidFill>
+                    <a:schemeClr val="tx1"/>
+                  </a:solidFill>
+                </a:rPr>
+                <a:t>email</a:t>
+              </a:r>
+            </a:p>
+            <a:p>
+              <a:r>
+                <a:rPr lang="en-US" altLang="ko-KR" sz="1200" dirty="0">
+                  <a:solidFill>
+                    <a:schemeClr val="tx1"/>
+                  </a:solidFill>
+                </a:rPr>
+                <a:t>email2</a:t>
+              </a:r>
+            </a:p>
+            <a:p>
+              <a:r>
+                <a:rPr lang="en-US" altLang="ko-KR" sz="1200" dirty="0" err="1">
+                  <a:solidFill>
+                    <a:schemeClr val="tx1"/>
+                  </a:solidFill>
+                </a:rPr>
+                <a:t>email_verified</a:t>
+              </a:r>
+              <a:endParaRPr lang="en-US" altLang="ko-KR" sz="1200" dirty="0">
+                <a:solidFill>
+                  <a:schemeClr val="tx1"/>
+                </a:solidFill>
+              </a:endParaRPr>
+            </a:p>
           </p:txBody>
         </p:sp>
         <p:sp>
@@ -4378,8 +4480,8 @@
         </p:nvCxnSpPr>
         <p:spPr>
           <a:xfrm flipH="1" flipV="1">
-            <a:off x="4790341" y="4908471"/>
-            <a:ext cx="1083782" cy="1331237"/>
+            <a:off x="4254958" y="4361560"/>
+            <a:ext cx="1619165" cy="1878148"/>
           </a:xfrm>
           <a:prstGeom prst="straightConnector1">
             <a:avLst/>
@@ -4930,8 +5032,8 @@
         </p:nvCxnSpPr>
         <p:spPr>
           <a:xfrm>
-            <a:off x="1373324" y="3004893"/>
-            <a:ext cx="1548471" cy="1903578"/>
+            <a:off x="1260411" y="2090239"/>
+            <a:ext cx="1126001" cy="2271321"/>
           </a:xfrm>
           <a:prstGeom prst="straightConnector1">
             <a:avLst/>
@@ -4972,7 +5074,7 @@
         </p:nvSpPr>
         <p:spPr>
           <a:xfrm>
-            <a:off x="601533" y="2273723"/>
+            <a:off x="488620" y="1359069"/>
             <a:ext cx="1543582" cy="731170"/>
           </a:xfrm>
           <a:prstGeom prst="diamond">
@@ -5748,8 +5850,8 @@
         </p:nvCxnSpPr>
         <p:spPr>
           <a:xfrm flipV="1">
-            <a:off x="2145115" y="1306231"/>
-            <a:ext cx="2445821" cy="1333077"/>
+            <a:off x="2032202" y="1306231"/>
+            <a:ext cx="2558734" cy="418423"/>
           </a:xfrm>
           <a:prstGeom prst="straightConnector1">
             <a:avLst/>
@@ -5793,8 +5895,8 @@
         </p:nvCxnSpPr>
         <p:spPr>
           <a:xfrm>
-            <a:off x="2469450" y="1101315"/>
-            <a:ext cx="452345" cy="3807156"/>
+            <a:off x="2138820" y="1026415"/>
+            <a:ext cx="247592" cy="3335145"/>
           </a:xfrm>
           <a:prstGeom prst="straightConnector1">
             <a:avLst/>
@@ -5835,7 +5937,7 @@
         </p:nvSpPr>
         <p:spPr>
           <a:xfrm>
-            <a:off x="1697659" y="370145"/>
+            <a:off x="1367029" y="295245"/>
             <a:ext cx="1543582" cy="731170"/>
           </a:xfrm>
           <a:prstGeom prst="diamond">
@@ -5915,8 +6017,8 @@
         </p:nvCxnSpPr>
         <p:spPr>
           <a:xfrm>
-            <a:off x="3241241" y="735730"/>
-            <a:ext cx="1349695" cy="570501"/>
+            <a:off x="2910611" y="660830"/>
+            <a:ext cx="1680325" cy="645401"/>
           </a:xfrm>
           <a:prstGeom prst="straightConnector1">
             <a:avLst/>
@@ -6591,7 +6693,7 @@
         </p:nvGrpSpPr>
         <p:grpSpPr>
           <a:xfrm>
-            <a:off x="543005" y="4972373"/>
+            <a:off x="297833" y="6671756"/>
             <a:ext cx="1868546" cy="1607986"/>
             <a:chOff x="2632648" y="4648872"/>
             <a:chExt cx="1656184" cy="3999629"/>
@@ -6651,6 +6753,9 @@
                   <a:solidFill>
                     <a:schemeClr val="tx1"/>
                   </a:solidFill>
+                  <a:highlight>
+                    <a:srgbClr val="00FF00"/>
+                  </a:highlight>
                 </a:rPr>
                 <a:t>user_id</a:t>
               </a:r>
@@ -6658,6 +6763,9 @@
                 <a:solidFill>
                   <a:schemeClr val="tx1"/>
                 </a:solidFill>
+                <a:highlight>
+                  <a:srgbClr val="00FF00"/>
+                </a:highlight>
               </a:endParaRPr>
             </a:p>
             <a:p>
@@ -6749,6 +6857,960 @@
                   </a:solidFill>
                 </a:rPr>
                 <a:t>old_id</a:t>
+              </a:r>
+              <a:endParaRPr lang="ko-KR" altLang="en-US" sz="1200" dirty="0">
+                <a:solidFill>
+                  <a:schemeClr val="tx1"/>
+                </a:solidFill>
+              </a:endParaRPr>
+            </a:p>
+          </p:txBody>
+        </p:sp>
+      </p:grpSp>
+      <p:grpSp>
+        <p:nvGrpSpPr>
+          <p:cNvPr id="2" name="Group 1">
+            <a:extLst>
+              <a:ext uri="{FF2B5EF4-FFF2-40B4-BE49-F238E27FC236}">
+                <a16:creationId xmlns:a16="http://schemas.microsoft.com/office/drawing/2014/main" id="{78923A57-0062-8CEF-8A17-D4ACBFD2D5C6}"/>
+              </a:ext>
+            </a:extLst>
+          </p:cNvPr>
+          <p:cNvGrpSpPr/>
+          <p:nvPr/>
+        </p:nvGrpSpPr>
+        <p:grpSpPr>
+          <a:xfrm>
+            <a:off x="303038" y="4872670"/>
+            <a:ext cx="1868546" cy="1607986"/>
+            <a:chOff x="2632648" y="4648872"/>
+            <a:chExt cx="1656184" cy="3999629"/>
+          </a:xfrm>
+        </p:grpSpPr>
+        <p:sp>
+          <p:nvSpPr>
+            <p:cNvPr id="4" name="Rectangle 3">
+              <a:extLst>
+                <a:ext uri="{FF2B5EF4-FFF2-40B4-BE49-F238E27FC236}">
+                  <a16:creationId xmlns:a16="http://schemas.microsoft.com/office/drawing/2014/main" id="{6965AD09-ED1F-2F7B-3FDA-CF63BFD21DB4}"/>
+                </a:ext>
+              </a:extLst>
+            </p:cNvPr>
+            <p:cNvSpPr/>
+            <p:nvPr/>
+          </p:nvSpPr>
+          <p:spPr>
+            <a:xfrm>
+              <a:off x="2632648" y="5259216"/>
+              <a:ext cx="1656184" cy="3389285"/>
+            </a:xfrm>
+            <a:prstGeom prst="rect">
+              <a:avLst/>
+            </a:prstGeom>
+            <a:solidFill>
+              <a:schemeClr val="bg1"/>
+            </a:solidFill>
+            <a:ln w="19050">
+              <a:solidFill>
+                <a:schemeClr val="tx1"/>
+              </a:solidFill>
+            </a:ln>
+          </p:spPr>
+          <p:style>
+            <a:lnRef idx="2">
+              <a:schemeClr val="accent1">
+                <a:shade val="50000"/>
+              </a:schemeClr>
+            </a:lnRef>
+            <a:fillRef idx="1">
+              <a:schemeClr val="accent1"/>
+            </a:fillRef>
+            <a:effectRef idx="0">
+              <a:schemeClr val="accent1"/>
+            </a:effectRef>
+            <a:fontRef idx="minor">
+              <a:schemeClr val="lt1"/>
+            </a:fontRef>
+          </p:style>
+          <p:txBody>
+            <a:bodyPr lIns="40616" tIns="40616" rIns="40616" bIns="40616" rtlCol="0" anchor="t"/>
+            <a:lstStyle/>
+            <a:p>
+              <a:r>
+                <a:rPr lang="en-US" altLang="ko-KR" sz="1200" dirty="0" err="1">
+                  <a:solidFill>
+                    <a:schemeClr val="tx1"/>
+                  </a:solidFill>
+                </a:rPr>
+                <a:t>last_updated</a:t>
+              </a:r>
+              <a:endParaRPr lang="en-US" altLang="ko-KR" sz="1200" dirty="0">
+                <a:solidFill>
+                  <a:schemeClr val="tx1"/>
+                </a:solidFill>
+              </a:endParaRPr>
+            </a:p>
+            <a:p>
+              <a:r>
+                <a:rPr lang="en-US" altLang="ko-KR" sz="1200" u="sng" dirty="0">
+                  <a:solidFill>
+                    <a:schemeClr val="tx1"/>
+                  </a:solidFill>
+                  <a:highlight>
+                    <a:srgbClr val="00FF00"/>
+                  </a:highlight>
+                </a:rPr>
+                <a:t>token</a:t>
+              </a:r>
+            </a:p>
+          </p:txBody>
+        </p:sp>
+        <p:sp>
+          <p:nvSpPr>
+            <p:cNvPr id="7" name="Rectangle 6">
+              <a:extLst>
+                <a:ext uri="{FF2B5EF4-FFF2-40B4-BE49-F238E27FC236}">
+                  <a16:creationId xmlns:a16="http://schemas.microsoft.com/office/drawing/2014/main" id="{050A35D6-636B-48BD-0BBB-09DB3763A7E8}"/>
+                </a:ext>
+              </a:extLst>
+            </p:cNvPr>
+            <p:cNvSpPr/>
+            <p:nvPr/>
+          </p:nvSpPr>
+          <p:spPr>
+            <a:xfrm>
+              <a:off x="2632648" y="4648872"/>
+              <a:ext cx="1656184" cy="610347"/>
+            </a:xfrm>
+            <a:prstGeom prst="rect">
+              <a:avLst/>
+            </a:prstGeom>
+            <a:solidFill>
+              <a:schemeClr val="bg1"/>
+            </a:solidFill>
+            <a:ln w="19050">
+              <a:solidFill>
+                <a:schemeClr val="tx1"/>
+              </a:solidFill>
+            </a:ln>
+          </p:spPr>
+          <p:style>
+            <a:lnRef idx="2">
+              <a:schemeClr val="accent1">
+                <a:shade val="50000"/>
+              </a:schemeClr>
+            </a:lnRef>
+            <a:fillRef idx="1">
+              <a:schemeClr val="accent1"/>
+            </a:fillRef>
+            <a:effectRef idx="0">
+              <a:schemeClr val="accent1"/>
+            </a:effectRef>
+            <a:fontRef idx="minor">
+              <a:schemeClr val="lt1"/>
+            </a:fontRef>
+          </p:style>
+          <p:txBody>
+            <a:bodyPr lIns="0" tIns="0" rIns="0" bIns="0" rtlCol="0" anchor="ctr"/>
+            <a:lstStyle/>
+            <a:p>
+              <a:pPr algn="ctr"/>
+              <a:r>
+                <a:rPr lang="en-US" altLang="ko-KR" sz="1200" dirty="0">
+                  <a:solidFill>
+                    <a:schemeClr val="tx1"/>
+                  </a:solidFill>
+                </a:rPr>
+                <a:t>session</a:t>
+              </a:r>
+              <a:endParaRPr lang="ko-KR" altLang="en-US" sz="1200" dirty="0">
+                <a:solidFill>
+                  <a:schemeClr val="tx1"/>
+                </a:solidFill>
+              </a:endParaRPr>
+            </a:p>
+          </p:txBody>
+        </p:sp>
+      </p:grpSp>
+      <p:cxnSp>
+        <p:nvCxnSpPr>
+          <p:cNvPr id="9" name="Straight Arrow Connector 8">
+            <a:extLst>
+              <a:ext uri="{FF2B5EF4-FFF2-40B4-BE49-F238E27FC236}">
+                <a16:creationId xmlns:a16="http://schemas.microsoft.com/office/drawing/2014/main" id="{0E185426-6FAA-70E5-D685-F81B3237DA1D}"/>
+              </a:ext>
+            </a:extLst>
+          </p:cNvPr>
+          <p:cNvCxnSpPr>
+            <a:cxnSpLocks/>
+            <a:stCxn id="10" idx="3"/>
+            <a:endCxn id="5" idx="1"/>
+          </p:cNvCxnSpPr>
+          <p:nvPr/>
+        </p:nvCxnSpPr>
+        <p:spPr>
+          <a:xfrm>
+            <a:off x="1921387" y="3849592"/>
+            <a:ext cx="465025" cy="511968"/>
+          </a:xfrm>
+          <a:prstGeom prst="straightConnector1">
+            <a:avLst/>
+          </a:prstGeom>
+          <a:ln w="38100">
+            <a:solidFill>
+              <a:schemeClr val="tx1"/>
+            </a:solidFill>
+            <a:tailEnd type="triangle"/>
+          </a:ln>
+        </p:spPr>
+        <p:style>
+          <a:lnRef idx="1">
+            <a:schemeClr val="accent1"/>
+          </a:lnRef>
+          <a:fillRef idx="0">
+            <a:schemeClr val="accent1"/>
+          </a:fillRef>
+          <a:effectRef idx="0">
+            <a:schemeClr val="accent1"/>
+          </a:effectRef>
+          <a:fontRef idx="minor">
+            <a:schemeClr val="tx1"/>
+          </a:fontRef>
+        </p:style>
+      </p:cxnSp>
+      <p:sp>
+        <p:nvSpPr>
+          <p:cNvPr id="10" name="Diamond 9">
+            <a:extLst>
+              <a:ext uri="{FF2B5EF4-FFF2-40B4-BE49-F238E27FC236}">
+                <a16:creationId xmlns:a16="http://schemas.microsoft.com/office/drawing/2014/main" id="{1D9B1FCF-4992-D0AE-61E7-4B155D814FC0}"/>
+              </a:ext>
+            </a:extLst>
+          </p:cNvPr>
+          <p:cNvSpPr/>
+          <p:nvPr/>
+        </p:nvSpPr>
+        <p:spPr>
+          <a:xfrm>
+            <a:off x="193195" y="3484007"/>
+            <a:ext cx="1728192" cy="731170"/>
+          </a:xfrm>
+          <a:prstGeom prst="diamond">
+            <a:avLst/>
+          </a:prstGeom>
+          <a:solidFill>
+            <a:schemeClr val="bg1"/>
+          </a:solidFill>
+          <a:ln w="19050">
+            <a:solidFill>
+              <a:schemeClr val="tx1"/>
+            </a:solidFill>
+          </a:ln>
+        </p:spPr>
+        <p:style>
+          <a:lnRef idx="2">
+            <a:schemeClr val="accent1">
+              <a:shade val="50000"/>
+            </a:schemeClr>
+          </a:lnRef>
+          <a:fillRef idx="1">
+            <a:schemeClr val="accent1"/>
+          </a:fillRef>
+          <a:effectRef idx="0">
+            <a:schemeClr val="accent1"/>
+          </a:effectRef>
+          <a:fontRef idx="minor">
+            <a:schemeClr val="lt1"/>
+          </a:fontRef>
+        </p:style>
+        <p:txBody>
+          <a:bodyPr lIns="40616" tIns="40616" rIns="40616" bIns="40616" rtlCol="0" anchor="t"/>
+          <a:lstStyle/>
+          <a:p>
+            <a:pPr algn="ctr"/>
+            <a:r>
+              <a:rPr lang="en-US" altLang="ko-KR" sz="1200" dirty="0" err="1">
+                <a:solidFill>
+                  <a:schemeClr val="tx1"/>
+                </a:solidFill>
+              </a:rPr>
+              <a:t>session_rel</a:t>
+            </a:r>
+            <a:endParaRPr lang="ko-KR" altLang="en-US" sz="1200" dirty="0" err="1">
+              <a:solidFill>
+                <a:schemeClr val="tx1"/>
+              </a:solidFill>
+            </a:endParaRPr>
+          </a:p>
+        </p:txBody>
+      </p:sp>
+      <p:cxnSp>
+        <p:nvCxnSpPr>
+          <p:cNvPr id="11" name="Straight Arrow Connector 10">
+            <a:extLst>
+              <a:ext uri="{FF2B5EF4-FFF2-40B4-BE49-F238E27FC236}">
+                <a16:creationId xmlns:a16="http://schemas.microsoft.com/office/drawing/2014/main" id="{0E2C938A-98A5-5B9A-C1E6-2D7059FD70F5}"/>
+              </a:ext>
+            </a:extLst>
+          </p:cNvPr>
+          <p:cNvCxnSpPr>
+            <a:cxnSpLocks/>
+            <a:stCxn id="10" idx="2"/>
+            <a:endCxn id="7" idx="0"/>
+          </p:cNvCxnSpPr>
+          <p:nvPr/>
+        </p:nvCxnSpPr>
+        <p:spPr>
+          <a:xfrm>
+            <a:off x="1057291" y="4215177"/>
+            <a:ext cx="180020" cy="657493"/>
+          </a:xfrm>
+          <a:prstGeom prst="straightConnector1">
+            <a:avLst/>
+          </a:prstGeom>
+          <a:ln w="57150" cmpd="dbl">
+            <a:solidFill>
+              <a:schemeClr val="tx1"/>
+            </a:solidFill>
+            <a:tailEnd type="none"/>
+          </a:ln>
+        </p:spPr>
+        <p:style>
+          <a:lnRef idx="1">
+            <a:schemeClr val="accent1"/>
+          </a:lnRef>
+          <a:fillRef idx="0">
+            <a:schemeClr val="accent1"/>
+          </a:fillRef>
+          <a:effectRef idx="0">
+            <a:schemeClr val="accent1"/>
+          </a:effectRef>
+          <a:fontRef idx="minor">
+            <a:schemeClr val="tx1"/>
+          </a:fontRef>
+        </p:style>
+      </p:cxnSp>
+      <p:grpSp>
+        <p:nvGrpSpPr>
+          <p:cNvPr id="25" name="Group 24">
+            <a:extLst>
+              <a:ext uri="{FF2B5EF4-FFF2-40B4-BE49-F238E27FC236}">
+                <a16:creationId xmlns:a16="http://schemas.microsoft.com/office/drawing/2014/main" id="{2C952F41-27A7-9C32-808C-477905DA867C}"/>
+              </a:ext>
+            </a:extLst>
+          </p:cNvPr>
+          <p:cNvGrpSpPr/>
+          <p:nvPr/>
+        </p:nvGrpSpPr>
+        <p:grpSpPr>
+          <a:xfrm>
+            <a:off x="270274" y="8458579"/>
+            <a:ext cx="1868546" cy="1607986"/>
+            <a:chOff x="2632648" y="4648872"/>
+            <a:chExt cx="1656184" cy="3999629"/>
+          </a:xfrm>
+        </p:grpSpPr>
+        <p:sp>
+          <p:nvSpPr>
+            <p:cNvPr id="26" name="Rectangle 25">
+              <a:extLst>
+                <a:ext uri="{FF2B5EF4-FFF2-40B4-BE49-F238E27FC236}">
+                  <a16:creationId xmlns:a16="http://schemas.microsoft.com/office/drawing/2014/main" id="{069B421E-E6CB-50E0-DE25-4F7ECC759391}"/>
+                </a:ext>
+              </a:extLst>
+            </p:cNvPr>
+            <p:cNvSpPr/>
+            <p:nvPr/>
+          </p:nvSpPr>
+          <p:spPr>
+            <a:xfrm>
+              <a:off x="2632648" y="5259216"/>
+              <a:ext cx="1656184" cy="3389285"/>
+            </a:xfrm>
+            <a:prstGeom prst="rect">
+              <a:avLst/>
+            </a:prstGeom>
+            <a:solidFill>
+              <a:schemeClr val="bg1"/>
+            </a:solidFill>
+            <a:ln w="19050">
+              <a:solidFill>
+                <a:schemeClr val="tx1"/>
+              </a:solidFill>
+            </a:ln>
+          </p:spPr>
+          <p:style>
+            <a:lnRef idx="2">
+              <a:schemeClr val="accent1">
+                <a:shade val="50000"/>
+              </a:schemeClr>
+            </a:lnRef>
+            <a:fillRef idx="1">
+              <a:schemeClr val="accent1"/>
+            </a:fillRef>
+            <a:effectRef idx="0">
+              <a:schemeClr val="accent1"/>
+            </a:effectRef>
+            <a:fontRef idx="minor">
+              <a:schemeClr val="lt1"/>
+            </a:fontRef>
+          </p:style>
+          <p:txBody>
+            <a:bodyPr lIns="40616" tIns="40616" rIns="40616" bIns="40616" rtlCol="0" anchor="t"/>
+            <a:lstStyle/>
+            <a:p>
+              <a:r>
+                <a:rPr lang="en-US" altLang="ko-KR" sz="1200" u="sng" dirty="0">
+                  <a:solidFill>
+                    <a:schemeClr val="tx1"/>
+                  </a:solidFill>
+                  <a:highlight>
+                    <a:srgbClr val="00FF00"/>
+                  </a:highlight>
+                </a:rPr>
+                <a:t>token</a:t>
+              </a:r>
+            </a:p>
+            <a:p>
+              <a:r>
+                <a:rPr lang="en-US" altLang="ko-KR" sz="1200" dirty="0" err="1">
+                  <a:solidFill>
+                    <a:schemeClr val="tx1"/>
+                  </a:solidFill>
+                  <a:highlight>
+                    <a:srgbClr val="FFFF00"/>
+                  </a:highlight>
+                </a:rPr>
+                <a:t>last_updated</a:t>
+              </a:r>
+              <a:endParaRPr lang="en-US" altLang="ko-KR" sz="1200" dirty="0">
+                <a:solidFill>
+                  <a:schemeClr val="tx1"/>
+                </a:solidFill>
+                <a:highlight>
+                  <a:srgbClr val="FFFF00"/>
+                </a:highlight>
+              </a:endParaRPr>
+            </a:p>
+          </p:txBody>
+        </p:sp>
+        <p:sp>
+          <p:nvSpPr>
+            <p:cNvPr id="27" name="Rectangle 26">
+              <a:extLst>
+                <a:ext uri="{FF2B5EF4-FFF2-40B4-BE49-F238E27FC236}">
+                  <a16:creationId xmlns:a16="http://schemas.microsoft.com/office/drawing/2014/main" id="{00B894C3-DEFE-58FB-6686-56046A9B2E82}"/>
+                </a:ext>
+              </a:extLst>
+            </p:cNvPr>
+            <p:cNvSpPr/>
+            <p:nvPr/>
+          </p:nvSpPr>
+          <p:spPr>
+            <a:xfrm>
+              <a:off x="2632648" y="4648872"/>
+              <a:ext cx="1656184" cy="610347"/>
+            </a:xfrm>
+            <a:prstGeom prst="rect">
+              <a:avLst/>
+            </a:prstGeom>
+            <a:solidFill>
+              <a:schemeClr val="bg1"/>
+            </a:solidFill>
+            <a:ln w="19050">
+              <a:solidFill>
+                <a:schemeClr val="tx1"/>
+              </a:solidFill>
+            </a:ln>
+          </p:spPr>
+          <p:style>
+            <a:lnRef idx="2">
+              <a:schemeClr val="accent1">
+                <a:shade val="50000"/>
+              </a:schemeClr>
+            </a:lnRef>
+            <a:fillRef idx="1">
+              <a:schemeClr val="accent1"/>
+            </a:fillRef>
+            <a:effectRef idx="0">
+              <a:schemeClr val="accent1"/>
+            </a:effectRef>
+            <a:fontRef idx="minor">
+              <a:schemeClr val="lt1"/>
+            </a:fontRef>
+          </p:style>
+          <p:txBody>
+            <a:bodyPr lIns="0" tIns="0" rIns="0" bIns="0" rtlCol="0" anchor="ctr"/>
+            <a:lstStyle/>
+            <a:p>
+              <a:pPr algn="ctr"/>
+              <a:r>
+                <a:rPr lang="en-US" altLang="ko-KR" sz="1200" dirty="0" err="1">
+                  <a:solidFill>
+                    <a:schemeClr val="tx1"/>
+                  </a:solidFill>
+                </a:rPr>
+                <a:t>google_consent</a:t>
+              </a:r>
+              <a:endParaRPr lang="ko-KR" altLang="en-US" sz="1200" dirty="0">
+                <a:solidFill>
+                  <a:schemeClr val="tx1"/>
+                </a:solidFill>
+              </a:endParaRPr>
+            </a:p>
+          </p:txBody>
+        </p:sp>
+      </p:grpSp>
+      <p:sp>
+        <p:nvSpPr>
+          <p:cNvPr id="28" name="Rectangle 27">
+            <a:extLst>
+              <a:ext uri="{FF2B5EF4-FFF2-40B4-BE49-F238E27FC236}">
+                <a16:creationId xmlns:a16="http://schemas.microsoft.com/office/drawing/2014/main" id="{13258678-B578-DC50-B985-7A4E3E827BB9}"/>
+              </a:ext>
+            </a:extLst>
+          </p:cNvPr>
+          <p:cNvSpPr/>
+          <p:nvPr/>
+        </p:nvSpPr>
+        <p:spPr>
+          <a:xfrm>
+            <a:off x="270274" y="11202715"/>
+            <a:ext cx="1868546" cy="936104"/>
+          </a:xfrm>
+          <a:prstGeom prst="rect">
+            <a:avLst/>
+          </a:prstGeom>
+          <a:solidFill>
+            <a:schemeClr val="bg1"/>
+          </a:solidFill>
+          <a:ln w="19050">
+            <a:solidFill>
+              <a:schemeClr val="tx1"/>
+            </a:solidFill>
+          </a:ln>
+        </p:spPr>
+        <p:style>
+          <a:lnRef idx="2">
+            <a:schemeClr val="accent1">
+              <a:shade val="50000"/>
+            </a:schemeClr>
+          </a:lnRef>
+          <a:fillRef idx="1">
+            <a:schemeClr val="accent1"/>
+          </a:fillRef>
+          <a:effectRef idx="0">
+            <a:schemeClr val="accent1"/>
+          </a:effectRef>
+          <a:fontRef idx="minor">
+            <a:schemeClr val="lt1"/>
+          </a:fontRef>
+        </p:style>
+        <p:txBody>
+          <a:bodyPr lIns="40616" tIns="40616" rIns="40616" bIns="40616" rtlCol="0" anchor="t"/>
+          <a:lstStyle/>
+          <a:p>
+            <a:r>
+              <a:rPr lang="ko-KR" altLang="en-US" sz="1200" dirty="0">
+                <a:solidFill>
+                  <a:schemeClr val="tx1"/>
+                </a:solidFill>
+              </a:rPr>
+              <a:t>음영 표기 참고 사항</a:t>
+            </a:r>
+            <a:r>
+              <a:rPr lang="en-US" altLang="ko-KR" sz="1200" dirty="0">
+                <a:solidFill>
+                  <a:schemeClr val="tx1"/>
+                </a:solidFill>
+              </a:rPr>
+              <a:t>:</a:t>
+            </a:r>
+          </a:p>
+          <a:p>
+            <a:endParaRPr lang="en-US" altLang="ko-KR" sz="1200" dirty="0">
+              <a:solidFill>
+                <a:schemeClr val="tx1"/>
+              </a:solidFill>
+            </a:endParaRPr>
+          </a:p>
+          <a:p>
+            <a:r>
+              <a:rPr lang="en-US" altLang="ko-KR" sz="1200" dirty="0">
+                <a:solidFill>
+                  <a:schemeClr val="tx1"/>
+                </a:solidFill>
+                <a:highlight>
+                  <a:srgbClr val="00FF00"/>
+                </a:highlight>
+              </a:rPr>
+              <a:t>select</a:t>
+            </a:r>
+          </a:p>
+          <a:p>
+            <a:r>
+              <a:rPr lang="en-US" altLang="ko-KR" sz="1200" dirty="0" err="1">
+                <a:solidFill>
+                  <a:schemeClr val="tx1"/>
+                </a:solidFill>
+                <a:highlight>
+                  <a:srgbClr val="FFFF00"/>
+                </a:highlight>
+              </a:rPr>
+              <a:t>orderby</a:t>
+            </a:r>
+            <a:endParaRPr lang="en-US" altLang="ko-KR" sz="1200" dirty="0">
+              <a:solidFill>
+                <a:schemeClr val="tx1"/>
+              </a:solidFill>
+              <a:highlight>
+                <a:srgbClr val="FFFF00"/>
+              </a:highlight>
+            </a:endParaRPr>
+          </a:p>
+        </p:txBody>
+      </p:sp>
+      <p:grpSp>
+        <p:nvGrpSpPr>
+          <p:cNvPr id="29" name="Group 28">
+            <a:extLst>
+              <a:ext uri="{FF2B5EF4-FFF2-40B4-BE49-F238E27FC236}">
+                <a16:creationId xmlns:a16="http://schemas.microsoft.com/office/drawing/2014/main" id="{C412169C-963F-2F4F-6A31-31252F699B58}"/>
+              </a:ext>
+            </a:extLst>
+          </p:cNvPr>
+          <p:cNvGrpSpPr/>
+          <p:nvPr/>
+        </p:nvGrpSpPr>
+        <p:grpSpPr>
+          <a:xfrm>
+            <a:off x="2377296" y="8494572"/>
+            <a:ext cx="1868546" cy="1607986"/>
+            <a:chOff x="2632648" y="4648872"/>
+            <a:chExt cx="1656184" cy="3999629"/>
+          </a:xfrm>
+        </p:grpSpPr>
+        <p:sp>
+          <p:nvSpPr>
+            <p:cNvPr id="30" name="Rectangle 29">
+              <a:extLst>
+                <a:ext uri="{FF2B5EF4-FFF2-40B4-BE49-F238E27FC236}">
+                  <a16:creationId xmlns:a16="http://schemas.microsoft.com/office/drawing/2014/main" id="{547586FD-A15D-6A74-9F61-9698A0E0C016}"/>
+                </a:ext>
+              </a:extLst>
+            </p:cNvPr>
+            <p:cNvSpPr/>
+            <p:nvPr/>
+          </p:nvSpPr>
+          <p:spPr>
+            <a:xfrm>
+              <a:off x="2632648" y="5259216"/>
+              <a:ext cx="1656184" cy="3389285"/>
+            </a:xfrm>
+            <a:prstGeom prst="rect">
+              <a:avLst/>
+            </a:prstGeom>
+            <a:solidFill>
+              <a:schemeClr val="bg1"/>
+            </a:solidFill>
+            <a:ln w="19050">
+              <a:solidFill>
+                <a:schemeClr val="tx1"/>
+              </a:solidFill>
+            </a:ln>
+          </p:spPr>
+          <p:style>
+            <a:lnRef idx="2">
+              <a:schemeClr val="accent1">
+                <a:shade val="50000"/>
+              </a:schemeClr>
+            </a:lnRef>
+            <a:fillRef idx="1">
+              <a:schemeClr val="accent1"/>
+            </a:fillRef>
+            <a:effectRef idx="0">
+              <a:schemeClr val="accent1"/>
+            </a:effectRef>
+            <a:fontRef idx="minor">
+              <a:schemeClr val="lt1"/>
+            </a:fontRef>
+          </p:style>
+          <p:txBody>
+            <a:bodyPr lIns="40616" tIns="40616" rIns="40616" bIns="40616" rtlCol="0" anchor="t"/>
+            <a:lstStyle/>
+            <a:p>
+              <a:r>
+                <a:rPr lang="en-US" altLang="ko-KR" sz="1200" u="sng" dirty="0">
+                  <a:solidFill>
+                    <a:schemeClr val="tx1"/>
+                  </a:solidFill>
+                  <a:highlight>
+                    <a:srgbClr val="00FF00"/>
+                  </a:highlight>
+                </a:rPr>
+                <a:t>email</a:t>
+              </a:r>
+            </a:p>
+            <a:p>
+              <a:r>
+                <a:rPr lang="en-US" altLang="ko-KR" sz="1200" u="sng" dirty="0">
+                  <a:solidFill>
+                    <a:schemeClr val="tx1"/>
+                  </a:solidFill>
+                  <a:highlight>
+                    <a:srgbClr val="00FF00"/>
+                  </a:highlight>
+                </a:rPr>
+                <a:t>email2</a:t>
+              </a:r>
+            </a:p>
+            <a:p>
+              <a:r>
+                <a:rPr lang="en-US" altLang="ko-KR" sz="1200" dirty="0">
+                  <a:solidFill>
+                    <a:schemeClr val="tx1"/>
+                  </a:solidFill>
+                </a:rPr>
+                <a:t>code</a:t>
+              </a:r>
+            </a:p>
+            <a:p>
+              <a:r>
+                <a:rPr lang="en-US" altLang="ko-KR" sz="1200" dirty="0" err="1">
+                  <a:solidFill>
+                    <a:schemeClr val="tx1"/>
+                  </a:solidFill>
+                </a:rPr>
+                <a:t>last_updated</a:t>
+              </a:r>
+              <a:endParaRPr lang="en-US" altLang="ko-KR" sz="1200" dirty="0">
+                <a:solidFill>
+                  <a:schemeClr val="tx1"/>
+                </a:solidFill>
+              </a:endParaRPr>
+            </a:p>
+          </p:txBody>
+        </p:sp>
+        <p:sp>
+          <p:nvSpPr>
+            <p:cNvPr id="31" name="Rectangle 30">
+              <a:extLst>
+                <a:ext uri="{FF2B5EF4-FFF2-40B4-BE49-F238E27FC236}">
+                  <a16:creationId xmlns:a16="http://schemas.microsoft.com/office/drawing/2014/main" id="{2DE60EB0-E6CA-BB29-A7D0-48D8387AA20D}"/>
+                </a:ext>
+              </a:extLst>
+            </p:cNvPr>
+            <p:cNvSpPr/>
+            <p:nvPr/>
+          </p:nvSpPr>
+          <p:spPr>
+            <a:xfrm>
+              <a:off x="2632648" y="4648872"/>
+              <a:ext cx="1656184" cy="610347"/>
+            </a:xfrm>
+            <a:prstGeom prst="rect">
+              <a:avLst/>
+            </a:prstGeom>
+            <a:solidFill>
+              <a:schemeClr val="bg1"/>
+            </a:solidFill>
+            <a:ln w="19050">
+              <a:solidFill>
+                <a:schemeClr val="tx1"/>
+              </a:solidFill>
+            </a:ln>
+          </p:spPr>
+          <p:style>
+            <a:lnRef idx="2">
+              <a:schemeClr val="accent1">
+                <a:shade val="50000"/>
+              </a:schemeClr>
+            </a:lnRef>
+            <a:fillRef idx="1">
+              <a:schemeClr val="accent1"/>
+            </a:fillRef>
+            <a:effectRef idx="0">
+              <a:schemeClr val="accent1"/>
+            </a:effectRef>
+            <a:fontRef idx="minor">
+              <a:schemeClr val="lt1"/>
+            </a:fontRef>
+          </p:style>
+          <p:txBody>
+            <a:bodyPr lIns="0" tIns="0" rIns="0" bIns="0" rtlCol="0" anchor="ctr"/>
+            <a:lstStyle/>
+            <a:p>
+              <a:pPr algn="ctr"/>
+              <a:r>
+                <a:rPr lang="en-US" altLang="ko-KR" sz="1200" dirty="0" err="1">
+                  <a:solidFill>
+                    <a:schemeClr val="tx1"/>
+                  </a:solidFill>
+                </a:rPr>
+                <a:t>email_verification</a:t>
+              </a:r>
+              <a:endParaRPr lang="ko-KR" altLang="en-US" sz="1200" dirty="0">
+                <a:solidFill>
+                  <a:schemeClr val="tx1"/>
+                </a:solidFill>
+              </a:endParaRPr>
+            </a:p>
+          </p:txBody>
+        </p:sp>
+      </p:grpSp>
+      <p:grpSp>
+        <p:nvGrpSpPr>
+          <p:cNvPr id="224" name="Group 223">
+            <a:extLst>
+              <a:ext uri="{FF2B5EF4-FFF2-40B4-BE49-F238E27FC236}">
+                <a16:creationId xmlns:a16="http://schemas.microsoft.com/office/drawing/2014/main" id="{BEE959DC-2C82-453B-011B-906CF7EA1E11}"/>
+              </a:ext>
+            </a:extLst>
+          </p:cNvPr>
+          <p:cNvGrpSpPr/>
+          <p:nvPr/>
+        </p:nvGrpSpPr>
+        <p:grpSpPr>
+          <a:xfrm>
+            <a:off x="2377296" y="6655189"/>
+            <a:ext cx="1868546" cy="1607986"/>
+            <a:chOff x="2632648" y="4648872"/>
+            <a:chExt cx="1656184" cy="3999629"/>
+          </a:xfrm>
+        </p:grpSpPr>
+        <p:sp>
+          <p:nvSpPr>
+            <p:cNvPr id="225" name="Rectangle 224">
+              <a:extLst>
+                <a:ext uri="{FF2B5EF4-FFF2-40B4-BE49-F238E27FC236}">
+                  <a16:creationId xmlns:a16="http://schemas.microsoft.com/office/drawing/2014/main" id="{5A647213-A7C7-C1B4-ECF9-4B22E4CB7E06}"/>
+                </a:ext>
+              </a:extLst>
+            </p:cNvPr>
+            <p:cNvSpPr/>
+            <p:nvPr/>
+          </p:nvSpPr>
+          <p:spPr>
+            <a:xfrm>
+              <a:off x="2632648" y="5259216"/>
+              <a:ext cx="1656184" cy="3389285"/>
+            </a:xfrm>
+            <a:prstGeom prst="rect">
+              <a:avLst/>
+            </a:prstGeom>
+            <a:solidFill>
+              <a:schemeClr val="bg1"/>
+            </a:solidFill>
+            <a:ln w="19050">
+              <a:solidFill>
+                <a:schemeClr val="tx1"/>
+              </a:solidFill>
+            </a:ln>
+          </p:spPr>
+          <p:style>
+            <a:lnRef idx="2">
+              <a:schemeClr val="accent1">
+                <a:shade val="50000"/>
+              </a:schemeClr>
+            </a:lnRef>
+            <a:fillRef idx="1">
+              <a:schemeClr val="accent1"/>
+            </a:fillRef>
+            <a:effectRef idx="0">
+              <a:schemeClr val="accent1"/>
+            </a:effectRef>
+            <a:fontRef idx="minor">
+              <a:schemeClr val="lt1"/>
+            </a:fontRef>
+          </p:style>
+          <p:txBody>
+            <a:bodyPr lIns="40616" tIns="40616" rIns="40616" bIns="40616" rtlCol="0" anchor="t"/>
+            <a:lstStyle/>
+            <a:p>
+              <a:r>
+                <a:rPr lang="en-US" altLang="ko-KR" sz="1200" u="sng" dirty="0" err="1">
+                  <a:solidFill>
+                    <a:schemeClr val="tx1"/>
+                  </a:solidFill>
+                  <a:highlight>
+                    <a:srgbClr val="00FF00"/>
+                  </a:highlight>
+                </a:rPr>
+                <a:t>user_id</a:t>
+              </a:r>
+              <a:endParaRPr lang="en-US" altLang="ko-KR" sz="1200" dirty="0">
+                <a:solidFill>
+                  <a:schemeClr val="tx1"/>
+                </a:solidFill>
+              </a:endParaRPr>
+            </a:p>
+          </p:txBody>
+        </p:sp>
+        <p:sp>
+          <p:nvSpPr>
+            <p:cNvPr id="226" name="Rectangle 225">
+              <a:extLst>
+                <a:ext uri="{FF2B5EF4-FFF2-40B4-BE49-F238E27FC236}">
+                  <a16:creationId xmlns:a16="http://schemas.microsoft.com/office/drawing/2014/main" id="{1EE240E6-F1AB-79AE-AF0A-603C37F56955}"/>
+                </a:ext>
+              </a:extLst>
+            </p:cNvPr>
+            <p:cNvSpPr/>
+            <p:nvPr/>
+          </p:nvSpPr>
+          <p:spPr>
+            <a:xfrm>
+              <a:off x="2632648" y="4648872"/>
+              <a:ext cx="1656184" cy="610347"/>
+            </a:xfrm>
+            <a:prstGeom prst="rect">
+              <a:avLst/>
+            </a:prstGeom>
+            <a:solidFill>
+              <a:schemeClr val="bg1"/>
+            </a:solidFill>
+            <a:ln w="19050">
+              <a:solidFill>
+                <a:schemeClr val="tx1"/>
+              </a:solidFill>
+            </a:ln>
+          </p:spPr>
+          <p:style>
+            <a:lnRef idx="2">
+              <a:schemeClr val="accent1">
+                <a:shade val="50000"/>
+              </a:schemeClr>
+            </a:lnRef>
+            <a:fillRef idx="1">
+              <a:schemeClr val="accent1"/>
+            </a:fillRef>
+            <a:effectRef idx="0">
+              <a:schemeClr val="accent1"/>
+            </a:effectRef>
+            <a:fontRef idx="minor">
+              <a:schemeClr val="lt1"/>
+            </a:fontRef>
+          </p:style>
+          <p:txBody>
+            <a:bodyPr lIns="0" tIns="0" rIns="0" bIns="0" rtlCol="0" anchor="ctr"/>
+            <a:lstStyle/>
+            <a:p>
+              <a:pPr algn="ctr"/>
+              <a:r>
+                <a:rPr lang="en-US" altLang="ko-KR" sz="1200" dirty="0" err="1">
+                  <a:solidFill>
+                    <a:schemeClr val="tx1"/>
+                  </a:solidFill>
+                </a:rPr>
+                <a:t>all_id</a:t>
+              </a:r>
+              <a:r>
+                <a:rPr lang="en-US" altLang="ko-KR" sz="1200" dirty="0">
+                  <a:solidFill>
+                    <a:schemeClr val="tx1"/>
+                  </a:solidFill>
+                </a:rPr>
+                <a:t> &lt;view&gt;</a:t>
               </a:r>
               <a:endParaRPr lang="ko-KR" altLang="en-US" sz="1200" dirty="0">
                 <a:solidFill>

</xml_diff>

<commit_message>
update informative text files
Please note that the text files are committed separately from the other commits.
Always refer to the newer readme that are closest when possible.
</commit_message>
<xml_diff>
--- a/READUS/reminder-web-er.pptx
+++ b/READUS/reminder-web-er.pptx
@@ -109,7 +109,7 @@
   </p:defaultTextStyle>
   <p:extLst>
     <p:ext uri="{EFAFB233-063F-42B5-8137-9DF3F51BA10A}">
-      <p15:sldGuideLst xmlns:p15="http://schemas.microsoft.com/office/powerpoint/2012/main">
+      <p15:sldGuideLst xmlns:p15="http://schemas.microsoft.com/office/powerpoint/2012/main" xmlns="">
         <p15:guide id="1" orient="horz" pos="9098" userDrawn="1">
           <p15:clr>
             <a:srgbClr val="A4A3A4"/>
@@ -123,7 +123,7 @@
       </p15:sldGuideLst>
     </p:ext>
     <p:ext uri="{2D200454-40CA-4A62-9FC3-DE9A4176ACB9}">
-      <p15:notesGuideLst xmlns:p15="http://schemas.microsoft.com/office/powerpoint/2012/main"/>
+      <p15:notesGuideLst xmlns:p15="http://schemas.microsoft.com/office/powerpoint/2012/main" xmlns=""/>
     </p:ext>
   </p:extLst>
 </p:presentation>
@@ -211,7 +211,8 @@
           <a:p>
             <a:fld id="{5ADA11A1-5AD6-489A-9144-FC3497B7B873}" type="datetimeFigureOut">
               <a:rPr lang="ko-KR" altLang="en-US" smtClean="0"/>
-              <a:t>2025-11-25</a:t>
+              <a:pPr/>
+              <a:t>2025-12-11</a:t>
             </a:fld>
             <a:endParaRPr lang="ko-KR" altLang="en-US"/>
           </a:p>
@@ -370,6 +371,7 @@
           <a:p>
             <a:fld id="{26331A80-826D-4336-9BA0-FC036B4B206A}" type="slidenum">
               <a:rPr lang="ko-KR" altLang="en-US" smtClean="0"/>
+              <a:pPr/>
               <a:t>‹#›</a:t>
             </a:fld>
             <a:endParaRPr lang="ko-KR" altLang="en-US"/>
@@ -379,7 +381,7 @@
     </p:spTree>
     <p:extLst>
       <p:ext uri="{BB962C8B-B14F-4D97-AF65-F5344CB8AC3E}">
-        <p14:creationId xmlns:p14="http://schemas.microsoft.com/office/powerpoint/2010/main" val="1601897097"/>
+        <p14:creationId xmlns:p14="http://schemas.microsoft.com/office/powerpoint/2010/main" xmlns="" val="1601897097"/>
       </p:ext>
     </p:extLst>
   </p:cSld>
@@ -544,6 +546,7 @@
           <a:p>
             <a:fld id="{26331A80-826D-4336-9BA0-FC036B4B206A}" type="slidenum">
               <a:rPr lang="ko-KR" altLang="en-US" smtClean="0"/>
+              <a:pPr/>
               <a:t>1</a:t>
             </a:fld>
             <a:endParaRPr lang="ko-KR" altLang="en-US"/>
@@ -553,7 +556,7 @@
     </p:spTree>
     <p:extLst>
       <p:ext uri="{BB962C8B-B14F-4D97-AF65-F5344CB8AC3E}">
-        <p14:creationId xmlns:p14="http://schemas.microsoft.com/office/powerpoint/2010/main" val="4281771369"/>
+        <p14:creationId xmlns:p14="http://schemas.microsoft.com/office/powerpoint/2010/main" xmlns="" val="4281771369"/>
       </p:ext>
     </p:extLst>
   </p:cSld>
@@ -745,7 +748,7 @@
             <a:fld id="{D3633D0A-AEB7-4A32-B80E-995D605C0F6A}" type="datetimeFigureOut">
               <a:rPr lang="ko-KR" altLang="en-US" smtClean="0"/>
               <a:pPr/>
-              <a:t>2025-11-25</a:t>
+              <a:t>2025-12-11</a:t>
             </a:fld>
             <a:endParaRPr lang="ko-KR" altLang="en-US"/>
           </a:p>
@@ -912,7 +915,7 @@
             <a:fld id="{D3633D0A-AEB7-4A32-B80E-995D605C0F6A}" type="datetimeFigureOut">
               <a:rPr lang="ko-KR" altLang="en-US" smtClean="0"/>
               <a:pPr/>
-              <a:t>2025-11-25</a:t>
+              <a:t>2025-12-11</a:t>
             </a:fld>
             <a:endParaRPr lang="ko-KR" altLang="en-US"/>
           </a:p>
@@ -1089,7 +1092,7 @@
             <a:fld id="{D3633D0A-AEB7-4A32-B80E-995D605C0F6A}" type="datetimeFigureOut">
               <a:rPr lang="ko-KR" altLang="en-US" smtClean="0"/>
               <a:pPr/>
-              <a:t>2025-11-25</a:t>
+              <a:t>2025-12-11</a:t>
             </a:fld>
             <a:endParaRPr lang="ko-KR" altLang="en-US"/>
           </a:p>
@@ -1256,7 +1259,7 @@
             <a:fld id="{D3633D0A-AEB7-4A32-B80E-995D605C0F6A}" type="datetimeFigureOut">
               <a:rPr lang="ko-KR" altLang="en-US" smtClean="0"/>
               <a:pPr/>
-              <a:t>2025-11-25</a:t>
+              <a:t>2025-12-11</a:t>
             </a:fld>
             <a:endParaRPr lang="ko-KR" altLang="en-US"/>
           </a:p>
@@ -1499,7 +1502,7 @@
             <a:fld id="{D3633D0A-AEB7-4A32-B80E-995D605C0F6A}" type="datetimeFigureOut">
               <a:rPr lang="ko-KR" altLang="en-US" smtClean="0"/>
               <a:pPr/>
-              <a:t>2025-11-25</a:t>
+              <a:t>2025-12-11</a:t>
             </a:fld>
             <a:endParaRPr lang="ko-KR" altLang="en-US"/>
           </a:p>
@@ -1784,7 +1787,7 @@
             <a:fld id="{D3633D0A-AEB7-4A32-B80E-995D605C0F6A}" type="datetimeFigureOut">
               <a:rPr lang="ko-KR" altLang="en-US" smtClean="0"/>
               <a:pPr/>
-              <a:t>2025-11-25</a:t>
+              <a:t>2025-12-11</a:t>
             </a:fld>
             <a:endParaRPr lang="ko-KR" altLang="en-US"/>
           </a:p>
@@ -2203,7 +2206,7 @@
             <a:fld id="{D3633D0A-AEB7-4A32-B80E-995D605C0F6A}" type="datetimeFigureOut">
               <a:rPr lang="ko-KR" altLang="en-US" smtClean="0"/>
               <a:pPr/>
-              <a:t>2025-11-25</a:t>
+              <a:t>2025-12-11</a:t>
             </a:fld>
             <a:endParaRPr lang="ko-KR" altLang="en-US"/>
           </a:p>
@@ -2318,7 +2321,7 @@
             <a:fld id="{D3633D0A-AEB7-4A32-B80E-995D605C0F6A}" type="datetimeFigureOut">
               <a:rPr lang="ko-KR" altLang="en-US" smtClean="0"/>
               <a:pPr/>
-              <a:t>2025-11-25</a:t>
+              <a:t>2025-12-11</a:t>
             </a:fld>
             <a:endParaRPr lang="ko-KR" altLang="en-US"/>
           </a:p>
@@ -2410,7 +2413,7 @@
             <a:fld id="{D3633D0A-AEB7-4A32-B80E-995D605C0F6A}" type="datetimeFigureOut">
               <a:rPr lang="ko-KR" altLang="en-US" smtClean="0"/>
               <a:pPr/>
-              <a:t>2025-11-25</a:t>
+              <a:t>2025-12-11</a:t>
             </a:fld>
             <a:endParaRPr lang="ko-KR" altLang="en-US"/>
           </a:p>
@@ -2684,7 +2687,7 @@
             <a:fld id="{D3633D0A-AEB7-4A32-B80E-995D605C0F6A}" type="datetimeFigureOut">
               <a:rPr lang="ko-KR" altLang="en-US" smtClean="0"/>
               <a:pPr/>
-              <a:t>2025-11-25</a:t>
+              <a:t>2025-12-11</a:t>
             </a:fld>
             <a:endParaRPr lang="ko-KR" altLang="en-US"/>
           </a:p>
@@ -2934,7 +2937,7 @@
             <a:fld id="{D3633D0A-AEB7-4A32-B80E-995D605C0F6A}" type="datetimeFigureOut">
               <a:rPr lang="ko-KR" altLang="en-US" smtClean="0"/>
               <a:pPr/>
-              <a:t>2025-11-25</a:t>
+              <a:t>2025-12-11</a:t>
             </a:fld>
             <a:endParaRPr lang="ko-KR" altLang="en-US"/>
           </a:p>
@@ -3144,7 +3147,7 @@
             <a:fld id="{D3633D0A-AEB7-4A32-B80E-995D605C0F6A}" type="datetimeFigureOut">
               <a:rPr lang="ko-KR" altLang="en-US" smtClean="0"/>
               <a:pPr/>
-              <a:t>2025-11-25</a:t>
+              <a:t>2025-12-11</a:t>
             </a:fld>
             <a:endParaRPr lang="ko-KR" altLang="en-US"/>
           </a:p>
@@ -3523,8 +3526,8 @@
         </p:nvGrpSpPr>
         <p:grpSpPr>
           <a:xfrm>
-            <a:off x="2386412" y="1942836"/>
-            <a:ext cx="1868546" cy="4512482"/>
+            <a:off x="2345731" y="1985691"/>
+            <a:ext cx="1868546" cy="4464496"/>
             <a:chOff x="2632648" y="4648872"/>
             <a:chExt cx="1656184" cy="3999632"/>
           </a:xfrm>
@@ -3914,12 +3917,27 @@
             </a:p>
             <a:p>
               <a:r>
-                <a:rPr lang="en-US" altLang="ko-KR" sz="1200" dirty="0" err="1">
+                <a:rPr lang="en-US" altLang="ko-KR" sz="1200" dirty="0" err="1" smtClean="0">
                   <a:solidFill>
                     <a:schemeClr val="tx1"/>
                   </a:solidFill>
                 </a:rPr>
                 <a:t>last_updated</a:t>
+              </a:r>
+              <a:endParaRPr lang="en-US" altLang="ko-KR" sz="1200" dirty="0" smtClean="0">
+                <a:solidFill>
+                  <a:schemeClr val="tx1"/>
+                </a:solidFill>
+              </a:endParaRPr>
+            </a:p>
+            <a:p>
+              <a:r>
+                <a:rPr lang="en-US" altLang="ko-KR" sz="1200" smtClean="0">
+                  <a:solidFill>
+                    <a:schemeClr val="tx1"/>
+                  </a:solidFill>
+                </a:rPr>
+                <a:t>use_image</a:t>
               </a:r>
               <a:endParaRPr lang="en-US" altLang="ko-KR" sz="1200" dirty="0">
                 <a:solidFill>
@@ -4002,8 +4020,8 @@
         </p:nvCxnSpPr>
         <p:spPr>
           <a:xfrm flipH="1" flipV="1">
-            <a:off x="4254958" y="4361560"/>
-            <a:ext cx="3779405" cy="631858"/>
+            <a:off x="4214277" y="4378694"/>
+            <a:ext cx="3820086" cy="614724"/>
           </a:xfrm>
           <a:prstGeom prst="straightConnector1">
             <a:avLst/>
@@ -4235,7 +4253,7 @@
           <p:cNvPr id="19" name="Group 18">
             <a:extLst>
               <a:ext uri="{FF2B5EF4-FFF2-40B4-BE49-F238E27FC236}">
-                <a16:creationId xmlns:a16="http://schemas.microsoft.com/office/drawing/2014/main" id="{198CF282-3028-58DF-8FFC-C5EF6D11740A}"/>
+                <a16:creationId xmlns:a16="http://schemas.microsoft.com/office/drawing/2014/main" xmlns="" id="{198CF282-3028-58DF-8FFC-C5EF6D11740A}"/>
               </a:ext>
             </a:extLst>
           </p:cNvPr>
@@ -4244,8 +4262,8 @@
         </p:nvGrpSpPr>
         <p:grpSpPr>
           <a:xfrm>
-            <a:off x="8034363" y="5994328"/>
-            <a:ext cx="1868546" cy="1607986"/>
+            <a:off x="8034363" y="5802115"/>
+            <a:ext cx="1868546" cy="2016224"/>
             <a:chOff x="2632648" y="4648872"/>
             <a:chExt cx="1656184" cy="3999629"/>
           </a:xfrm>
@@ -4255,7 +4273,7 @@
             <p:cNvPr id="20" name="Rectangle 19">
               <a:extLst>
                 <a:ext uri="{FF2B5EF4-FFF2-40B4-BE49-F238E27FC236}">
-                  <a16:creationId xmlns:a16="http://schemas.microsoft.com/office/drawing/2014/main" id="{E50A1385-EACB-252B-0BD5-081B90AA28F9}"/>
+                  <a16:creationId xmlns:a16="http://schemas.microsoft.com/office/drawing/2014/main" xmlns="" id="{E50A1385-EACB-252B-0BD5-081B90AA28F9}"/>
                 </a:ext>
               </a:extLst>
             </p:cNvPr>
@@ -4300,13 +4318,28 @@
             <a:lstStyle/>
             <a:p>
               <a:r>
-                <a:rPr lang="en-US" altLang="ko-KR" sz="1200" dirty="0">
+                <a:rPr lang="en-US" altLang="ko-KR" sz="1200" dirty="0" smtClean="0">
                   <a:solidFill>
                     <a:schemeClr val="tx1"/>
                   </a:solidFill>
                 </a:rPr>
                 <a:t>type</a:t>
               </a:r>
+            </a:p>
+            <a:p>
+              <a:r>
+                <a:rPr lang="en-US" altLang="ko-KR" sz="1200" dirty="0" err="1" smtClean="0">
+                  <a:solidFill>
+                    <a:schemeClr val="tx1"/>
+                  </a:solidFill>
+                </a:rPr>
+                <a:t>issys</a:t>
+              </a:r>
+              <a:endParaRPr lang="en-US" altLang="ko-KR" sz="1200" dirty="0">
+                <a:solidFill>
+                  <a:schemeClr val="tx1"/>
+                </a:solidFill>
+              </a:endParaRPr>
             </a:p>
             <a:p>
               <a:r>
@@ -4355,14 +4388,14 @@
             </a:p>
             <a:p>
               <a:r>
-                <a:rPr lang="en-US" altLang="ko-KR" sz="1200" dirty="0" err="1">
+                <a:rPr lang="en-US" altLang="ko-KR" sz="1200" dirty="0" err="1" smtClean="0">
                   <a:solidFill>
                     <a:schemeClr val="tx1"/>
                   </a:solidFill>
                 </a:rPr>
                 <a:t>last_modified</a:t>
               </a:r>
-              <a:endParaRPr lang="en-US" altLang="ko-KR" sz="1200" dirty="0">
+              <a:endParaRPr lang="en-US" altLang="ko-KR" sz="1200" dirty="0" smtClean="0">
                 <a:solidFill>
                   <a:schemeClr val="tx1"/>
                 </a:solidFill>
@@ -4370,28 +4403,42 @@
             </a:p>
             <a:p>
               <a:r>
-                <a:rPr lang="en-US" altLang="ko-KR" sz="1200" dirty="0">
+                <a:rPr lang="en-US" altLang="ko-KR" sz="1200" dirty="0" err="1" smtClean="0">
                   <a:solidFill>
                     <a:schemeClr val="tx1"/>
                   </a:solidFill>
                 </a:rPr>
-                <a:t>(</a:t>
+                <a:t>last_opened</a:t>
               </a:r>
+              <a:endParaRPr lang="en-US" altLang="ko-KR" sz="1200" dirty="0" smtClean="0">
+                <a:solidFill>
+                  <a:schemeClr val="tx1"/>
+                </a:solidFill>
+              </a:endParaRPr>
+            </a:p>
+            <a:p>
               <a:r>
-                <a:rPr lang="en-US" altLang="ko-KR" sz="1200" dirty="0" err="1">
+                <a:rPr lang="en-US" altLang="ko-KR" sz="1200" dirty="0" err="1" smtClean="0">
                   <a:solidFill>
                     <a:schemeClr val="tx1"/>
                   </a:solidFill>
                 </a:rPr>
-                <a:t>file_deleted</a:t>
+                <a:t>to_delete</a:t>
               </a:r>
+              <a:endParaRPr lang="en-US" altLang="ko-KR" sz="1200" dirty="0" smtClean="0">
+                <a:solidFill>
+                  <a:schemeClr val="tx1"/>
+                </a:solidFill>
+              </a:endParaRPr>
+            </a:p>
+            <a:p>
               <a:r>
-                <a:rPr lang="en-US" altLang="ko-KR" sz="1200" dirty="0">
+                <a:rPr lang="en-US" altLang="ko-KR" sz="1200" dirty="0" smtClean="0">
                   <a:solidFill>
                     <a:schemeClr val="tx1"/>
                   </a:solidFill>
                 </a:rPr>
-                <a:t>)</a:t>
+                <a:t>mark</a:t>
               </a:r>
             </a:p>
           </p:txBody>
@@ -4401,7 +4448,7 @@
             <p:cNvPr id="21" name="Rectangle 20">
               <a:extLst>
                 <a:ext uri="{FF2B5EF4-FFF2-40B4-BE49-F238E27FC236}">
-                  <a16:creationId xmlns:a16="http://schemas.microsoft.com/office/drawing/2014/main" id="{69CED1C1-C8A6-CD04-1372-8F76EF005063}"/>
+                  <a16:creationId xmlns:a16="http://schemas.microsoft.com/office/drawing/2014/main" xmlns="" id="{69CED1C1-C8A6-CD04-1372-8F76EF005063}"/>
                 </a:ext>
               </a:extLst>
             </p:cNvPr>
@@ -4468,7 +4515,7 @@
           <p:cNvPr id="22" name="Straight Arrow Connector 21">
             <a:extLst>
               <a:ext uri="{FF2B5EF4-FFF2-40B4-BE49-F238E27FC236}">
-                <a16:creationId xmlns:a16="http://schemas.microsoft.com/office/drawing/2014/main" id="{7F732747-9B1E-D5E0-A200-D6D99FF6F39A}"/>
+                <a16:creationId xmlns:a16="http://schemas.microsoft.com/office/drawing/2014/main" xmlns="" id="{7F732747-9B1E-D5E0-A200-D6D99FF6F39A}"/>
               </a:ext>
             </a:extLst>
           </p:cNvPr>
@@ -4480,8 +4527,8 @@
         </p:nvCxnSpPr>
         <p:spPr>
           <a:xfrm flipH="1" flipV="1">
-            <a:off x="4254958" y="4361560"/>
-            <a:ext cx="1619165" cy="1878148"/>
+            <a:off x="4214277" y="4378694"/>
+            <a:ext cx="1659846" cy="1861014"/>
           </a:xfrm>
           <a:prstGeom prst="straightConnector1">
             <a:avLst/>
@@ -4513,7 +4560,7 @@
           <p:cNvPr id="23" name="Diamond 22">
             <a:extLst>
               <a:ext uri="{FF2B5EF4-FFF2-40B4-BE49-F238E27FC236}">
-                <a16:creationId xmlns:a16="http://schemas.microsoft.com/office/drawing/2014/main" id="{7EFB3C19-4634-394C-3F56-114316A58A5B}"/>
+                <a16:creationId xmlns:a16="http://schemas.microsoft.com/office/drawing/2014/main" xmlns="" id="{7EFB3C19-4634-394C-3F56-114316A58A5B}"/>
               </a:ext>
             </a:extLst>
           </p:cNvPr>
@@ -4579,7 +4626,7 @@
           <p:cNvPr id="24" name="Straight Arrow Connector 23">
             <a:extLst>
               <a:ext uri="{FF2B5EF4-FFF2-40B4-BE49-F238E27FC236}">
-                <a16:creationId xmlns:a16="http://schemas.microsoft.com/office/drawing/2014/main" id="{E0727D1E-6978-BD9F-A7D5-8EE20798CB11}"/>
+                <a16:creationId xmlns:a16="http://schemas.microsoft.com/office/drawing/2014/main" xmlns="" id="{E0727D1E-6978-BD9F-A7D5-8EE20798CB11}"/>
               </a:ext>
             </a:extLst>
           </p:cNvPr>
@@ -4593,7 +4640,7 @@
         <p:spPr>
           <a:xfrm>
             <a:off x="7602315" y="6239708"/>
-            <a:ext cx="432048" cy="681303"/>
+            <a:ext cx="432048" cy="724357"/>
           </a:xfrm>
           <a:prstGeom prst="straightConnector1">
             <a:avLst/>
@@ -4625,7 +4672,7 @@
           <p:cNvPr id="47" name="Straight Arrow Connector 46">
             <a:extLst>
               <a:ext uri="{FF2B5EF4-FFF2-40B4-BE49-F238E27FC236}">
-                <a16:creationId xmlns:a16="http://schemas.microsoft.com/office/drawing/2014/main" id="{B7437EBE-1F4C-E15A-91C3-7ECC9D0BE49B}"/>
+                <a16:creationId xmlns:a16="http://schemas.microsoft.com/office/drawing/2014/main" xmlns="" id="{B7437EBE-1F4C-E15A-91C3-7ECC9D0BE49B}"/>
               </a:ext>
             </a:extLst>
           </p:cNvPr>
@@ -4638,8 +4685,8 @@
         </p:nvCxnSpPr>
         <p:spPr>
           <a:xfrm flipH="1" flipV="1">
-            <a:off x="9902909" y="6117018"/>
-            <a:ext cx="1299806" cy="189153"/>
+            <a:off x="9902909" y="5955954"/>
+            <a:ext cx="1299806" cy="350217"/>
           </a:xfrm>
           <a:prstGeom prst="straightConnector1">
             <a:avLst/>
@@ -4671,7 +4718,7 @@
           <p:cNvPr id="48" name="Diamond 47">
             <a:extLst>
               <a:ext uri="{FF2B5EF4-FFF2-40B4-BE49-F238E27FC236}">
-                <a16:creationId xmlns:a16="http://schemas.microsoft.com/office/drawing/2014/main" id="{A0157D0A-9B0D-CA9E-51D5-A40064F934FC}"/>
+                <a16:creationId xmlns:a16="http://schemas.microsoft.com/office/drawing/2014/main" xmlns="" id="{A0157D0A-9B0D-CA9E-51D5-A40064F934FC}"/>
               </a:ext>
             </a:extLst>
           </p:cNvPr>
@@ -4748,7 +4795,7 @@
           <p:cNvPr id="49" name="Straight Arrow Connector 48">
             <a:extLst>
               <a:ext uri="{FF2B5EF4-FFF2-40B4-BE49-F238E27FC236}">
-                <a16:creationId xmlns:a16="http://schemas.microsoft.com/office/drawing/2014/main" id="{764B5F94-92FA-7A16-AB6C-A3CB64806A56}"/>
+                <a16:creationId xmlns:a16="http://schemas.microsoft.com/office/drawing/2014/main" xmlns="" id="{764B5F94-92FA-7A16-AB6C-A3CB64806A56}"/>
               </a:ext>
             </a:extLst>
           </p:cNvPr>
@@ -4761,8 +4808,8 @@
         </p:nvCxnSpPr>
         <p:spPr>
           <a:xfrm flipH="1" flipV="1">
-            <a:off x="9902909" y="6921011"/>
-            <a:ext cx="1299806" cy="116330"/>
+            <a:off x="9902909" y="6964065"/>
+            <a:ext cx="1299806" cy="73276"/>
           </a:xfrm>
           <a:prstGeom prst="straightConnector1">
             <a:avLst/>
@@ -4794,20 +4841,20 @@
           <p:cNvPr id="62" name="Straight Arrow Connector 61">
             <a:extLst>
               <a:ext uri="{FF2B5EF4-FFF2-40B4-BE49-F238E27FC236}">
-                <a16:creationId xmlns:a16="http://schemas.microsoft.com/office/drawing/2014/main" id="{93484198-E352-9BDC-2A14-8453F3576DD3}"/>
+                <a16:creationId xmlns:a16="http://schemas.microsoft.com/office/drawing/2014/main" xmlns="" id="{93484198-E352-9BDC-2A14-8453F3576DD3}"/>
               </a:ext>
             </a:extLst>
           </p:cNvPr>
           <p:cNvCxnSpPr>
             <a:stCxn id="63" idx="1"/>
-            <a:endCxn id="236" idx="2"/>
+            <a:endCxn id="236" idx="3"/>
           </p:cNvCxnSpPr>
           <p:nvPr/>
         </p:nvCxnSpPr>
         <p:spPr>
           <a:xfrm flipH="1" flipV="1">
-            <a:off x="5525209" y="1808430"/>
-            <a:ext cx="6037546" cy="1750878"/>
+            <a:off x="4214277" y="1184530"/>
+            <a:ext cx="7348478" cy="1094738"/>
           </a:xfrm>
           <a:prstGeom prst="straightConnector1">
             <a:avLst/>
@@ -4839,7 +4886,7 @@
           <p:cNvPr id="63" name="Diamond 62">
             <a:extLst>
               <a:ext uri="{FF2B5EF4-FFF2-40B4-BE49-F238E27FC236}">
-                <a16:creationId xmlns:a16="http://schemas.microsoft.com/office/drawing/2014/main" id="{641838C1-AA15-2B40-5E88-AD71916BBD42}"/>
+                <a16:creationId xmlns:a16="http://schemas.microsoft.com/office/drawing/2014/main" xmlns="" id="{641838C1-AA15-2B40-5E88-AD71916BBD42}"/>
               </a:ext>
             </a:extLst>
           </p:cNvPr>
@@ -4848,7 +4895,7 @@
         </p:nvSpPr>
         <p:spPr>
           <a:xfrm>
-            <a:off x="11562755" y="3193723"/>
+            <a:off x="11562755" y="1913683"/>
             <a:ext cx="1728192" cy="731170"/>
           </a:xfrm>
           <a:prstGeom prst="diamond">
@@ -4905,7 +4952,7 @@
           <p:cNvPr id="71" name="Rectangle 70">
             <a:extLst>
               <a:ext uri="{FF2B5EF4-FFF2-40B4-BE49-F238E27FC236}">
-                <a16:creationId xmlns:a16="http://schemas.microsoft.com/office/drawing/2014/main" id="{1E528718-FBCC-CBA4-8E82-51FA7CE4FDF7}"/>
+                <a16:creationId xmlns:a16="http://schemas.microsoft.com/office/drawing/2014/main" xmlns="" id="{1E528718-FBCC-CBA4-8E82-51FA7CE4FDF7}"/>
               </a:ext>
             </a:extLst>
           </p:cNvPr>
@@ -4970,7 +5017,7 @@
           <p:cNvPr id="74" name="Straight Connector 73">
             <a:extLst>
               <a:ext uri="{FF2B5EF4-FFF2-40B4-BE49-F238E27FC236}">
-                <a16:creationId xmlns:a16="http://schemas.microsoft.com/office/drawing/2014/main" id="{F02E7EA7-E8D9-0BF9-956E-E124D8C5DA47}"/>
+                <a16:creationId xmlns:a16="http://schemas.microsoft.com/office/drawing/2014/main" xmlns="" id="{F02E7EA7-E8D9-0BF9-956E-E124D8C5DA47}"/>
               </a:ext>
             </a:extLst>
           </p:cNvPr>
@@ -5020,7 +5067,7 @@
           <p:cNvPr id="81" name="Straight Arrow Connector 80">
             <a:extLst>
               <a:ext uri="{FF2B5EF4-FFF2-40B4-BE49-F238E27FC236}">
-                <a16:creationId xmlns:a16="http://schemas.microsoft.com/office/drawing/2014/main" id="{42D00A38-A9F0-5C76-944B-2367A8E12255}"/>
+                <a16:creationId xmlns:a16="http://schemas.microsoft.com/office/drawing/2014/main" xmlns="" id="{42D00A38-A9F0-5C76-944B-2367A8E12255}"/>
               </a:ext>
             </a:extLst>
           </p:cNvPr>
@@ -5032,8 +5079,8 @@
         </p:nvCxnSpPr>
         <p:spPr>
           <a:xfrm>
-            <a:off x="1260411" y="2090239"/>
-            <a:ext cx="1126001" cy="2271321"/>
+            <a:off x="957282" y="1924773"/>
+            <a:ext cx="1388449" cy="2453921"/>
           </a:xfrm>
           <a:prstGeom prst="straightConnector1">
             <a:avLst/>
@@ -5065,7 +5112,7 @@
           <p:cNvPr id="82" name="Diamond 81">
             <a:extLst>
               <a:ext uri="{FF2B5EF4-FFF2-40B4-BE49-F238E27FC236}">
-                <a16:creationId xmlns:a16="http://schemas.microsoft.com/office/drawing/2014/main" id="{7F37C94D-EF76-9539-D177-353D1BE4AF75}"/>
+                <a16:creationId xmlns:a16="http://schemas.microsoft.com/office/drawing/2014/main" xmlns="" id="{7F37C94D-EF76-9539-D177-353D1BE4AF75}"/>
               </a:ext>
             </a:extLst>
           </p:cNvPr>
@@ -5074,7 +5121,7 @@
         </p:nvSpPr>
         <p:spPr>
           <a:xfrm>
-            <a:off x="488620" y="1359069"/>
+            <a:off x="185491" y="1193603"/>
             <a:ext cx="1543582" cy="731170"/>
           </a:xfrm>
           <a:prstGeom prst="diamond">
@@ -5142,7 +5189,7 @@
           <p:cNvPr id="90" name="Rectangle 89">
             <a:extLst>
               <a:ext uri="{FF2B5EF4-FFF2-40B4-BE49-F238E27FC236}">
-                <a16:creationId xmlns:a16="http://schemas.microsoft.com/office/drawing/2014/main" id="{D31166ED-2507-C20B-D867-44121EE2180F}"/>
+                <a16:creationId xmlns:a16="http://schemas.microsoft.com/office/drawing/2014/main" xmlns="" id="{D31166ED-2507-C20B-D867-44121EE2180F}"/>
               </a:ext>
             </a:extLst>
           </p:cNvPr>
@@ -5151,7 +5198,7 @@
         </p:nvSpPr>
         <p:spPr>
           <a:xfrm>
-            <a:off x="12819232" y="4254814"/>
+            <a:off x="11706771" y="473523"/>
             <a:ext cx="1476165" cy="850721"/>
           </a:xfrm>
           <a:prstGeom prst="rect">
@@ -5247,7 +5294,7 @@
           <p:cNvPr id="109" name="Straight Arrow Connector 108">
             <a:extLst>
               <a:ext uri="{FF2B5EF4-FFF2-40B4-BE49-F238E27FC236}">
-                <a16:creationId xmlns:a16="http://schemas.microsoft.com/office/drawing/2014/main" id="{7BDA6574-764E-7569-DC1B-E7CA1EDF1FB6}"/>
+                <a16:creationId xmlns:a16="http://schemas.microsoft.com/office/drawing/2014/main" xmlns="" id="{7BDA6574-764E-7569-DC1B-E7CA1EDF1FB6}"/>
               </a:ext>
             </a:extLst>
           </p:cNvPr>
@@ -5258,9 +5305,9 @@
           <p:nvPr/>
         </p:nvCxnSpPr>
         <p:spPr>
-          <a:xfrm>
-            <a:off x="8589414" y="1538864"/>
-            <a:ext cx="669085" cy="104404"/>
+          <a:xfrm flipV="1">
+            <a:off x="8610427" y="1184530"/>
+            <a:ext cx="792088" cy="14618"/>
           </a:xfrm>
           <a:prstGeom prst="straightConnector1">
             <a:avLst/>
@@ -5292,7 +5339,7 @@
           <p:cNvPr id="114" name="Group 113">
             <a:extLst>
               <a:ext uri="{FF2B5EF4-FFF2-40B4-BE49-F238E27FC236}">
-                <a16:creationId xmlns:a16="http://schemas.microsoft.com/office/drawing/2014/main" id="{0ACDBE84-7196-906C-A1E5-56BDCD69E49D}"/>
+                <a16:creationId xmlns:a16="http://schemas.microsoft.com/office/drawing/2014/main" xmlns="" id="{0ACDBE84-7196-906C-A1E5-56BDCD69E49D}"/>
               </a:ext>
             </a:extLst>
           </p:cNvPr>
@@ -5301,7 +5348,7 @@
         </p:nvGrpSpPr>
         <p:grpSpPr>
           <a:xfrm>
-            <a:off x="9258499" y="932261"/>
+            <a:off x="9402515" y="473523"/>
             <a:ext cx="1868546" cy="1213206"/>
             <a:chOff x="2632648" y="4648869"/>
             <a:chExt cx="1656184" cy="3999635"/>
@@ -5312,7 +5359,7 @@
             <p:cNvPr id="115" name="Rectangle 114">
               <a:extLst>
                 <a:ext uri="{FF2B5EF4-FFF2-40B4-BE49-F238E27FC236}">
-                  <a16:creationId xmlns:a16="http://schemas.microsoft.com/office/drawing/2014/main" id="{F38411B1-7617-7D44-602D-65B5BA9B27FF}"/>
+                  <a16:creationId xmlns:a16="http://schemas.microsoft.com/office/drawing/2014/main" xmlns="" id="{F38411B1-7617-7D44-602D-65B5BA9B27FF}"/>
                 </a:ext>
               </a:extLst>
             </p:cNvPr>
@@ -5391,7 +5438,7 @@
             <p:cNvPr id="116" name="Rectangle 115">
               <a:extLst>
                 <a:ext uri="{FF2B5EF4-FFF2-40B4-BE49-F238E27FC236}">
-                  <a16:creationId xmlns:a16="http://schemas.microsoft.com/office/drawing/2014/main" id="{8ECE2030-D763-75E6-CC7A-79202E648D55}"/>
+                  <a16:creationId xmlns:a16="http://schemas.microsoft.com/office/drawing/2014/main" xmlns="" id="{8ECE2030-D763-75E6-CC7A-79202E648D55}"/>
                 </a:ext>
               </a:extLst>
             </p:cNvPr>
@@ -5458,7 +5505,7 @@
           <p:cNvPr id="156" name="Straight Arrow Connector 155">
             <a:extLst>
               <a:ext uri="{FF2B5EF4-FFF2-40B4-BE49-F238E27FC236}">
-                <a16:creationId xmlns:a16="http://schemas.microsoft.com/office/drawing/2014/main" id="{69168FD4-B7CA-368B-D236-C3F6569B58FE}"/>
+                <a16:creationId xmlns:a16="http://schemas.microsoft.com/office/drawing/2014/main" xmlns="" id="{69168FD4-B7CA-368B-D236-C3F6569B58FE}"/>
               </a:ext>
             </a:extLst>
           </p:cNvPr>
@@ -5471,8 +5518,8 @@
         </p:nvCxnSpPr>
         <p:spPr>
           <a:xfrm flipV="1">
-            <a:off x="11631101" y="3924893"/>
-            <a:ext cx="795750" cy="5527988"/>
+            <a:off x="11631101" y="2644853"/>
+            <a:ext cx="795750" cy="6808028"/>
           </a:xfrm>
           <a:prstGeom prst="straightConnector1">
             <a:avLst/>
@@ -5504,7 +5551,7 @@
           <p:cNvPr id="235" name="Group 234">
             <a:extLst>
               <a:ext uri="{FF2B5EF4-FFF2-40B4-BE49-F238E27FC236}">
-                <a16:creationId xmlns:a16="http://schemas.microsoft.com/office/drawing/2014/main" id="{D988A5F0-7015-6201-7F18-7C55D4E27D98}"/>
+                <a16:creationId xmlns:a16="http://schemas.microsoft.com/office/drawing/2014/main" xmlns="" id="{D988A5F0-7015-6201-7F18-7C55D4E27D98}"/>
               </a:ext>
             </a:extLst>
           </p:cNvPr>
@@ -5513,7 +5560,7 @@
         </p:nvGrpSpPr>
         <p:grpSpPr>
           <a:xfrm>
-            <a:off x="4590936" y="595224"/>
+            <a:off x="2345731" y="473523"/>
             <a:ext cx="1868547" cy="1213206"/>
             <a:chOff x="2632647" y="4648869"/>
             <a:chExt cx="1656185" cy="3999635"/>
@@ -5524,7 +5571,7 @@
             <p:cNvPr id="236" name="Rectangle 235">
               <a:extLst>
                 <a:ext uri="{FF2B5EF4-FFF2-40B4-BE49-F238E27FC236}">
-                  <a16:creationId xmlns:a16="http://schemas.microsoft.com/office/drawing/2014/main" id="{02E3AD7C-E0DF-F55C-BA2C-65D8444C233D}"/>
+                  <a16:creationId xmlns:a16="http://schemas.microsoft.com/office/drawing/2014/main" xmlns="" id="{02E3AD7C-E0DF-F55C-BA2C-65D8444C233D}"/>
                 </a:ext>
               </a:extLst>
             </p:cNvPr>
@@ -5598,7 +5645,7 @@
             <p:cNvPr id="237" name="Rectangle 236">
               <a:extLst>
                 <a:ext uri="{FF2B5EF4-FFF2-40B4-BE49-F238E27FC236}">
-                  <a16:creationId xmlns:a16="http://schemas.microsoft.com/office/drawing/2014/main" id="{AD5D4DA0-C66A-9864-3121-74D86E03FBC6}"/>
+                  <a16:creationId xmlns:a16="http://schemas.microsoft.com/office/drawing/2014/main" xmlns="" id="{AD5D4DA0-C66A-9864-3121-74D86E03FBC6}"/>
                 </a:ext>
               </a:extLst>
             </p:cNvPr>
@@ -5665,7 +5712,7 @@
           <p:cNvPr id="247" name="Diamond 246">
             <a:extLst>
               <a:ext uri="{FF2B5EF4-FFF2-40B4-BE49-F238E27FC236}">
-                <a16:creationId xmlns:a16="http://schemas.microsoft.com/office/drawing/2014/main" id="{1420F95B-8618-D61E-77F1-5E20E63367A2}"/>
+                <a16:creationId xmlns:a16="http://schemas.microsoft.com/office/drawing/2014/main" xmlns="" id="{1420F95B-8618-D61E-77F1-5E20E63367A2}"/>
               </a:ext>
             </a:extLst>
           </p:cNvPr>
@@ -5674,7 +5721,7 @@
         </p:nvSpPr>
         <p:spPr>
           <a:xfrm>
-            <a:off x="6861222" y="1173279"/>
+            <a:off x="6882235" y="833563"/>
             <a:ext cx="1728192" cy="731170"/>
           </a:xfrm>
           <a:prstGeom prst="diamond">
@@ -5742,7 +5789,7 @@
           <p:cNvPr id="249" name="Straight Arrow Connector 248">
             <a:extLst>
               <a:ext uri="{FF2B5EF4-FFF2-40B4-BE49-F238E27FC236}">
-                <a16:creationId xmlns:a16="http://schemas.microsoft.com/office/drawing/2014/main" id="{155498B4-5805-BB73-2A65-F9AD8F22283D}"/>
+                <a16:creationId xmlns:a16="http://schemas.microsoft.com/office/drawing/2014/main" xmlns="" id="{155498B4-5805-BB73-2A65-F9AD8F22283D}"/>
               </a:ext>
             </a:extLst>
           </p:cNvPr>
@@ -5754,8 +5801,8 @@
         </p:nvCxnSpPr>
         <p:spPr>
           <a:xfrm flipH="1" flipV="1">
-            <a:off x="6459482" y="1306231"/>
-            <a:ext cx="401740" cy="232633"/>
+            <a:off x="4214277" y="1184530"/>
+            <a:ext cx="2667958" cy="14618"/>
           </a:xfrm>
           <a:prstGeom prst="straightConnector1">
             <a:avLst/>
@@ -5787,21 +5834,21 @@
           <p:cNvPr id="266" name="Straight Connector 265">
             <a:extLst>
               <a:ext uri="{FF2B5EF4-FFF2-40B4-BE49-F238E27FC236}">
-                <a16:creationId xmlns:a16="http://schemas.microsoft.com/office/drawing/2014/main" id="{5263C430-A187-ACDA-2189-E96A850F56B4}"/>
+                <a16:creationId xmlns:a16="http://schemas.microsoft.com/office/drawing/2014/main" xmlns="" id="{5263C430-A187-ACDA-2189-E96A850F56B4}"/>
               </a:ext>
             </a:extLst>
           </p:cNvPr>
           <p:cNvCxnSpPr>
             <a:cxnSpLocks/>
-            <a:stCxn id="90" idx="0"/>
-            <a:endCxn id="63" idx="3"/>
+            <a:stCxn id="90" idx="2"/>
+            <a:endCxn id="63" idx="0"/>
           </p:cNvCxnSpPr>
           <p:nvPr/>
         </p:nvCxnSpPr>
         <p:spPr>
-          <a:xfrm flipH="1" flipV="1">
-            <a:off x="13290947" y="3559308"/>
-            <a:ext cx="266368" cy="695506"/>
+          <a:xfrm flipH="1">
+            <a:off x="12426851" y="1324244"/>
+            <a:ext cx="18003" cy="589439"/>
           </a:xfrm>
           <a:prstGeom prst="line">
             <a:avLst/>
@@ -5838,7 +5885,7 @@
           <p:cNvPr id="269" name="Straight Arrow Connector 268">
             <a:extLst>
               <a:ext uri="{FF2B5EF4-FFF2-40B4-BE49-F238E27FC236}">
-                <a16:creationId xmlns:a16="http://schemas.microsoft.com/office/drawing/2014/main" id="{BA9E11A2-8982-B827-EBAB-038AEE79C19B}"/>
+                <a16:creationId xmlns:a16="http://schemas.microsoft.com/office/drawing/2014/main" xmlns="" id="{BA9E11A2-8982-B827-EBAB-038AEE79C19B}"/>
               </a:ext>
             </a:extLst>
           </p:cNvPr>
@@ -5850,8 +5897,8 @@
         </p:nvCxnSpPr>
         <p:spPr>
           <a:xfrm flipV="1">
-            <a:off x="2032202" y="1306231"/>
-            <a:ext cx="2558734" cy="418423"/>
+            <a:off x="1729073" y="1184530"/>
+            <a:ext cx="616658" cy="374658"/>
           </a:xfrm>
           <a:prstGeom prst="straightConnector1">
             <a:avLst/>
@@ -5883,7 +5930,7 @@
           <p:cNvPr id="275" name="Straight Arrow Connector 274">
             <a:extLst>
               <a:ext uri="{FF2B5EF4-FFF2-40B4-BE49-F238E27FC236}">
-                <a16:creationId xmlns:a16="http://schemas.microsoft.com/office/drawing/2014/main" id="{517B0F27-907E-9D76-80A2-16F164F866E9}"/>
+                <a16:creationId xmlns:a16="http://schemas.microsoft.com/office/drawing/2014/main" xmlns="" id="{517B0F27-907E-9D76-80A2-16F164F866E9}"/>
               </a:ext>
             </a:extLst>
           </p:cNvPr>
@@ -5895,8 +5942,8 @@
         </p:nvCxnSpPr>
         <p:spPr>
           <a:xfrm>
-            <a:off x="2138820" y="1026415"/>
-            <a:ext cx="247592" cy="3335145"/>
+            <a:off x="957282" y="844653"/>
+            <a:ext cx="1388449" cy="3534041"/>
           </a:xfrm>
           <a:prstGeom prst="straightConnector1">
             <a:avLst/>
@@ -5928,7 +5975,7 @@
           <p:cNvPr id="276" name="Diamond 275">
             <a:extLst>
               <a:ext uri="{FF2B5EF4-FFF2-40B4-BE49-F238E27FC236}">
-                <a16:creationId xmlns:a16="http://schemas.microsoft.com/office/drawing/2014/main" id="{D22792B0-A6C6-0534-EC8D-CB9B46912D22}"/>
+                <a16:creationId xmlns:a16="http://schemas.microsoft.com/office/drawing/2014/main" xmlns="" id="{D22792B0-A6C6-0534-EC8D-CB9B46912D22}"/>
               </a:ext>
             </a:extLst>
           </p:cNvPr>
@@ -5937,7 +5984,7 @@
         </p:nvSpPr>
         <p:spPr>
           <a:xfrm>
-            <a:off x="1367029" y="295245"/>
+            <a:off x="185491" y="113483"/>
             <a:ext cx="1543582" cy="731170"/>
           </a:xfrm>
           <a:prstGeom prst="diamond">
@@ -6005,7 +6052,7 @@
           <p:cNvPr id="277" name="Straight Arrow Connector 276">
             <a:extLst>
               <a:ext uri="{FF2B5EF4-FFF2-40B4-BE49-F238E27FC236}">
-                <a16:creationId xmlns:a16="http://schemas.microsoft.com/office/drawing/2014/main" id="{2DB24178-E2A9-A5B3-3338-4C3E0B15A137}"/>
+                <a16:creationId xmlns:a16="http://schemas.microsoft.com/office/drawing/2014/main" xmlns="" id="{2DB24178-E2A9-A5B3-3338-4C3E0B15A137}"/>
               </a:ext>
             </a:extLst>
           </p:cNvPr>
@@ -6017,8 +6064,8 @@
         </p:nvCxnSpPr>
         <p:spPr>
           <a:xfrm>
-            <a:off x="2910611" y="660830"/>
-            <a:ext cx="1680325" cy="645401"/>
+            <a:off x="1729073" y="479068"/>
+            <a:ext cx="616658" cy="705462"/>
           </a:xfrm>
           <a:prstGeom prst="straightConnector1">
             <a:avLst/>
@@ -6050,7 +6097,7 @@
           <p:cNvPr id="300" name="TextBox 299">
             <a:extLst>
               <a:ext uri="{FF2B5EF4-FFF2-40B4-BE49-F238E27FC236}">
-                <a16:creationId xmlns:a16="http://schemas.microsoft.com/office/drawing/2014/main" id="{64DC6AAF-CF06-97E9-A941-253371649BEA}"/>
+                <a16:creationId xmlns:a16="http://schemas.microsoft.com/office/drawing/2014/main" xmlns="" id="{64DC6AAF-CF06-97E9-A941-253371649BEA}"/>
               </a:ext>
             </a:extLst>
           </p:cNvPr>
@@ -6086,7 +6133,7 @@
           <p:cNvPr id="301" name="TextBox 300">
             <a:extLst>
               <a:ext uri="{FF2B5EF4-FFF2-40B4-BE49-F238E27FC236}">
-                <a16:creationId xmlns:a16="http://schemas.microsoft.com/office/drawing/2014/main" id="{83C96048-4CED-012F-A1C6-66D4DE049D9E}"/>
+                <a16:creationId xmlns:a16="http://schemas.microsoft.com/office/drawing/2014/main" xmlns="" id="{83C96048-4CED-012F-A1C6-66D4DE049D9E}"/>
               </a:ext>
             </a:extLst>
           </p:cNvPr>
@@ -6122,7 +6169,7 @@
           <p:cNvPr id="3" name="TextBox 2">
             <a:extLst>
               <a:ext uri="{FF2B5EF4-FFF2-40B4-BE49-F238E27FC236}">
-                <a16:creationId xmlns:a16="http://schemas.microsoft.com/office/drawing/2014/main" id="{F6367AD9-D335-79ED-FD33-700380AA37CA}"/>
+                <a16:creationId xmlns:a16="http://schemas.microsoft.com/office/drawing/2014/main" xmlns="" id="{F6367AD9-D335-79ED-FD33-700380AA37CA}"/>
               </a:ext>
             </a:extLst>
           </p:cNvPr>
@@ -6131,7 +6178,7 @@
         </p:nvSpPr>
         <p:spPr>
           <a:xfrm>
-            <a:off x="5447882" y="4541676"/>
+            <a:off x="5442075" y="4361955"/>
             <a:ext cx="2096087" cy="276999"/>
           </a:xfrm>
           <a:prstGeom prst="rect">
@@ -6166,7 +6213,7 @@
           <p:cNvPr id="230" name="Group 229">
             <a:extLst>
               <a:ext uri="{FF2B5EF4-FFF2-40B4-BE49-F238E27FC236}">
-                <a16:creationId xmlns:a16="http://schemas.microsoft.com/office/drawing/2014/main" id="{E7B52B09-422F-9FAB-15DB-D328B139A4CF}"/>
+                <a16:creationId xmlns:a16="http://schemas.microsoft.com/office/drawing/2014/main" xmlns="" id="{E7B52B09-422F-9FAB-15DB-D328B139A4CF}"/>
               </a:ext>
             </a:extLst>
           </p:cNvPr>
@@ -6186,7 +6233,7 @@
             <p:cNvPr id="231" name="Rectangle 230">
               <a:extLst>
                 <a:ext uri="{FF2B5EF4-FFF2-40B4-BE49-F238E27FC236}">
-                  <a16:creationId xmlns:a16="http://schemas.microsoft.com/office/drawing/2014/main" id="{5781AF40-5E8B-B997-CAAC-F2649B859F6F}"/>
+                  <a16:creationId xmlns:a16="http://schemas.microsoft.com/office/drawing/2014/main" xmlns="" id="{5781AF40-5E8B-B997-CAAC-F2649B859F6F}"/>
                 </a:ext>
               </a:extLst>
             </p:cNvPr>
@@ -6258,7 +6305,7 @@
             <p:cNvPr id="232" name="Rectangle 231">
               <a:extLst>
                 <a:ext uri="{FF2B5EF4-FFF2-40B4-BE49-F238E27FC236}">
-                  <a16:creationId xmlns:a16="http://schemas.microsoft.com/office/drawing/2014/main" id="{35F46782-0BE7-811B-6FCB-AB10ACAA4AB9}"/>
+                  <a16:creationId xmlns:a16="http://schemas.microsoft.com/office/drawing/2014/main" xmlns="" id="{35F46782-0BE7-811B-6FCB-AB10ACAA4AB9}"/>
                 </a:ext>
               </a:extLst>
             </p:cNvPr>
@@ -6325,7 +6372,7 @@
           <p:cNvPr id="254" name="Straight Arrow Connector 253">
             <a:extLst>
               <a:ext uri="{FF2B5EF4-FFF2-40B4-BE49-F238E27FC236}">
-                <a16:creationId xmlns:a16="http://schemas.microsoft.com/office/drawing/2014/main" id="{64472CEC-529E-15A1-2715-A8F90C902A2D}"/>
+                <a16:creationId xmlns:a16="http://schemas.microsoft.com/office/drawing/2014/main" xmlns="" id="{64472CEC-529E-15A1-2715-A8F90C902A2D}"/>
               </a:ext>
             </a:extLst>
           </p:cNvPr>
@@ -6338,8 +6385,8 @@
         </p:nvCxnSpPr>
         <p:spPr>
           <a:xfrm rot="16200000" flipV="1">
-            <a:off x="9370790" y="7200160"/>
-            <a:ext cx="923884" cy="1728192"/>
+            <a:off x="9478803" y="7308173"/>
+            <a:ext cx="707859" cy="1728192"/>
           </a:xfrm>
           <a:prstGeom prst="bentConnector3">
             <a:avLst>
@@ -6373,7 +6420,7 @@
           <p:cNvPr id="39" name="Straight Arrow Connector 253">
             <a:extLst>
               <a:ext uri="{FF2B5EF4-FFF2-40B4-BE49-F238E27FC236}">
-                <a16:creationId xmlns:a16="http://schemas.microsoft.com/office/drawing/2014/main" id="{79F8458A-4341-C20B-B4ED-D983C98E4BA4}"/>
+                <a16:creationId xmlns:a16="http://schemas.microsoft.com/office/drawing/2014/main" xmlns="" id="{79F8458A-4341-C20B-B4ED-D983C98E4BA4}"/>
               </a:ext>
             </a:extLst>
           </p:cNvPr>
@@ -6386,8 +6433,8 @@
         </p:nvCxnSpPr>
         <p:spPr>
           <a:xfrm rot="5400000" flipH="1" flipV="1">
-            <a:off x="7827685" y="7337681"/>
-            <a:ext cx="876317" cy="1405585"/>
+            <a:off x="7935697" y="7445693"/>
+            <a:ext cx="660292" cy="1405585"/>
           </a:xfrm>
           <a:prstGeom prst="bentConnector3">
             <a:avLst>
@@ -6421,7 +6468,7 @@
           <p:cNvPr id="50" name="Rectangle 49">
             <a:extLst>
               <a:ext uri="{FF2B5EF4-FFF2-40B4-BE49-F238E27FC236}">
-                <a16:creationId xmlns:a16="http://schemas.microsoft.com/office/drawing/2014/main" id="{0C97F255-88A6-C1F6-6634-ECEE627747A6}"/>
+                <a16:creationId xmlns:a16="http://schemas.microsoft.com/office/drawing/2014/main" xmlns="" id="{0C97F255-88A6-C1F6-6634-ECEE627747A6}"/>
               </a:ext>
             </a:extLst>
           </p:cNvPr>
@@ -6430,7 +6477,7 @@
         </p:nvSpPr>
         <p:spPr>
           <a:xfrm>
-            <a:off x="9220664" y="7705461"/>
+            <a:off x="9258499" y="7818339"/>
             <a:ext cx="1224136" cy="288032"/>
           </a:xfrm>
           <a:prstGeom prst="rect">
@@ -6482,7 +6529,7 @@
           <p:cNvPr id="51" name="Straight Connector 50">
             <a:extLst>
               <a:ext uri="{FF2B5EF4-FFF2-40B4-BE49-F238E27FC236}">
-                <a16:creationId xmlns:a16="http://schemas.microsoft.com/office/drawing/2014/main" id="{C6156C06-2F1A-D8CF-D228-DEF411B4D558}"/>
+                <a16:creationId xmlns:a16="http://schemas.microsoft.com/office/drawing/2014/main" xmlns="" id="{C6156C06-2F1A-D8CF-D228-DEF411B4D558}"/>
               </a:ext>
             </a:extLst>
           </p:cNvPr>
@@ -6495,8 +6542,8 @@
         </p:nvCxnSpPr>
         <p:spPr>
           <a:xfrm>
-            <a:off x="8968636" y="7602314"/>
-            <a:ext cx="252028" cy="247163"/>
+            <a:off x="8968636" y="7818339"/>
+            <a:ext cx="289863" cy="144016"/>
           </a:xfrm>
           <a:prstGeom prst="line">
             <a:avLst/>
@@ -6533,7 +6580,7 @@
           <p:cNvPr id="278" name="Group 277">
             <a:extLst>
               <a:ext uri="{FF2B5EF4-FFF2-40B4-BE49-F238E27FC236}">
-                <a16:creationId xmlns:a16="http://schemas.microsoft.com/office/drawing/2014/main" id="{8D4BBE6D-B2EE-A13E-60EB-76BF868E4B71}"/>
+                <a16:creationId xmlns:a16="http://schemas.microsoft.com/office/drawing/2014/main" xmlns="" id="{8D4BBE6D-B2EE-A13E-60EB-76BF868E4B71}"/>
               </a:ext>
             </a:extLst>
           </p:cNvPr>
@@ -6553,7 +6600,7 @@
             <p:cNvPr id="279" name="Rectangle 278">
               <a:extLst>
                 <a:ext uri="{FF2B5EF4-FFF2-40B4-BE49-F238E27FC236}">
-                  <a16:creationId xmlns:a16="http://schemas.microsoft.com/office/drawing/2014/main" id="{6A09008C-05F0-68C3-88CB-F396170B4552}"/>
+                  <a16:creationId xmlns:a16="http://schemas.microsoft.com/office/drawing/2014/main" xmlns="" id="{6A09008C-05F0-68C3-88CB-F396170B4552}"/>
                 </a:ext>
               </a:extLst>
             </p:cNvPr>
@@ -6617,7 +6664,7 @@
             <p:cNvPr id="280" name="Rectangle 279">
               <a:extLst>
                 <a:ext uri="{FF2B5EF4-FFF2-40B4-BE49-F238E27FC236}">
-                  <a16:creationId xmlns:a16="http://schemas.microsoft.com/office/drawing/2014/main" id="{B23A159F-D896-BF70-C793-ECA0E170CF8F}"/>
+                  <a16:creationId xmlns:a16="http://schemas.microsoft.com/office/drawing/2014/main" xmlns="" id="{B23A159F-D896-BF70-C793-ECA0E170CF8F}"/>
                 </a:ext>
               </a:extLst>
             </p:cNvPr>
@@ -6684,7 +6731,7 @@
           <p:cNvPr id="79" name="Group 78">
             <a:extLst>
               <a:ext uri="{FF2B5EF4-FFF2-40B4-BE49-F238E27FC236}">
-                <a16:creationId xmlns:a16="http://schemas.microsoft.com/office/drawing/2014/main" id="{C146458B-FDE2-27E0-540F-4F78664CE69B}"/>
+                <a16:creationId xmlns:a16="http://schemas.microsoft.com/office/drawing/2014/main" xmlns="" id="{C146458B-FDE2-27E0-540F-4F78664CE69B}"/>
               </a:ext>
             </a:extLst>
           </p:cNvPr>
@@ -6693,7 +6740,7 @@
         </p:nvGrpSpPr>
         <p:grpSpPr>
           <a:xfrm>
-            <a:off x="297833" y="6671756"/>
+            <a:off x="329507" y="6666211"/>
             <a:ext cx="1868546" cy="1607986"/>
             <a:chOff x="2632648" y="4648872"/>
             <a:chExt cx="1656184" cy="3999629"/>
@@ -6704,7 +6751,7 @@
             <p:cNvPr id="80" name="Rectangle 79">
               <a:extLst>
                 <a:ext uri="{FF2B5EF4-FFF2-40B4-BE49-F238E27FC236}">
-                  <a16:creationId xmlns:a16="http://schemas.microsoft.com/office/drawing/2014/main" id="{8D130022-BC2D-393E-1A35-2606D4DDAB1B}"/>
+                  <a16:creationId xmlns:a16="http://schemas.microsoft.com/office/drawing/2014/main" xmlns="" id="{8D130022-BC2D-393E-1A35-2606D4DDAB1B}"/>
                 </a:ext>
               </a:extLst>
             </p:cNvPr>
@@ -6805,7 +6852,7 @@
             <p:cNvPr id="83" name="Rectangle 82">
               <a:extLst>
                 <a:ext uri="{FF2B5EF4-FFF2-40B4-BE49-F238E27FC236}">
-                  <a16:creationId xmlns:a16="http://schemas.microsoft.com/office/drawing/2014/main" id="{B37ED7D2-2087-3DDE-EDA7-6B4FC425F331}"/>
+                  <a16:creationId xmlns:a16="http://schemas.microsoft.com/office/drawing/2014/main" xmlns="" id="{B37ED7D2-2087-3DDE-EDA7-6B4FC425F331}"/>
                 </a:ext>
               </a:extLst>
             </p:cNvPr>
@@ -6872,7 +6919,7 @@
           <p:cNvPr id="2" name="Group 1">
             <a:extLst>
               <a:ext uri="{FF2B5EF4-FFF2-40B4-BE49-F238E27FC236}">
-                <a16:creationId xmlns:a16="http://schemas.microsoft.com/office/drawing/2014/main" id="{78923A57-0062-8CEF-8A17-D4ACBFD2D5C6}"/>
+                <a16:creationId xmlns:a16="http://schemas.microsoft.com/office/drawing/2014/main" xmlns="" id="{78923A57-0062-8CEF-8A17-D4ACBFD2D5C6}"/>
               </a:ext>
             </a:extLst>
           </p:cNvPr>
@@ -6881,7 +6928,7 @@
         </p:nvGrpSpPr>
         <p:grpSpPr>
           <a:xfrm>
-            <a:off x="303038" y="4872670"/>
+            <a:off x="329507" y="4866011"/>
             <a:ext cx="1868546" cy="1607986"/>
             <a:chOff x="2632648" y="4648872"/>
             <a:chExt cx="1656184" cy="3999629"/>
@@ -6892,7 +6939,7 @@
             <p:cNvPr id="4" name="Rectangle 3">
               <a:extLst>
                 <a:ext uri="{FF2B5EF4-FFF2-40B4-BE49-F238E27FC236}">
-                  <a16:creationId xmlns:a16="http://schemas.microsoft.com/office/drawing/2014/main" id="{6965AD09-ED1F-2F7B-3FDA-CF63BFD21DB4}"/>
+                  <a16:creationId xmlns:a16="http://schemas.microsoft.com/office/drawing/2014/main" xmlns="" id="{6965AD09-ED1F-2F7B-3FDA-CF63BFD21DB4}"/>
                 </a:ext>
               </a:extLst>
             </p:cNvPr>
@@ -6970,7 +7017,7 @@
             <p:cNvPr id="7" name="Rectangle 6">
               <a:extLst>
                 <a:ext uri="{FF2B5EF4-FFF2-40B4-BE49-F238E27FC236}">
-                  <a16:creationId xmlns:a16="http://schemas.microsoft.com/office/drawing/2014/main" id="{050A35D6-636B-48BD-0BBB-09DB3763A7E8}"/>
+                  <a16:creationId xmlns:a16="http://schemas.microsoft.com/office/drawing/2014/main" xmlns="" id="{050A35D6-636B-48BD-0BBB-09DB3763A7E8}"/>
                 </a:ext>
               </a:extLst>
             </p:cNvPr>
@@ -7037,7 +7084,7 @@
           <p:cNvPr id="9" name="Straight Arrow Connector 8">
             <a:extLst>
               <a:ext uri="{FF2B5EF4-FFF2-40B4-BE49-F238E27FC236}">
-                <a16:creationId xmlns:a16="http://schemas.microsoft.com/office/drawing/2014/main" id="{0E185426-6FAA-70E5-D685-F81B3237DA1D}"/>
+                <a16:creationId xmlns:a16="http://schemas.microsoft.com/office/drawing/2014/main" xmlns="" id="{0E185426-6FAA-70E5-D685-F81B3237DA1D}"/>
               </a:ext>
             </a:extLst>
           </p:cNvPr>
@@ -7051,7 +7098,7 @@
         <p:spPr>
           <a:xfrm>
             <a:off x="1921387" y="3849592"/>
-            <a:ext cx="465025" cy="511968"/>
+            <a:ext cx="424344" cy="529102"/>
           </a:xfrm>
           <a:prstGeom prst="straightConnector1">
             <a:avLst/>
@@ -7083,7 +7130,7 @@
           <p:cNvPr id="10" name="Diamond 9">
             <a:extLst>
               <a:ext uri="{FF2B5EF4-FFF2-40B4-BE49-F238E27FC236}">
-                <a16:creationId xmlns:a16="http://schemas.microsoft.com/office/drawing/2014/main" id="{1D9B1FCF-4992-D0AE-61E7-4B155D814FC0}"/>
+                <a16:creationId xmlns:a16="http://schemas.microsoft.com/office/drawing/2014/main" xmlns="" id="{1D9B1FCF-4992-D0AE-61E7-4B155D814FC0}"/>
               </a:ext>
             </a:extLst>
           </p:cNvPr>
@@ -7149,7 +7196,7 @@
           <p:cNvPr id="11" name="Straight Arrow Connector 10">
             <a:extLst>
               <a:ext uri="{FF2B5EF4-FFF2-40B4-BE49-F238E27FC236}">
-                <a16:creationId xmlns:a16="http://schemas.microsoft.com/office/drawing/2014/main" id="{0E2C938A-98A5-5B9A-C1E6-2D7059FD70F5}"/>
+                <a16:creationId xmlns:a16="http://schemas.microsoft.com/office/drawing/2014/main" xmlns="" id="{0E2C938A-98A5-5B9A-C1E6-2D7059FD70F5}"/>
               </a:ext>
             </a:extLst>
           </p:cNvPr>
@@ -7163,7 +7210,7 @@
         <p:spPr>
           <a:xfrm>
             <a:off x="1057291" y="4215177"/>
-            <a:ext cx="180020" cy="657493"/>
+            <a:ext cx="206489" cy="650834"/>
           </a:xfrm>
           <a:prstGeom prst="straightConnector1">
             <a:avLst/>
@@ -7195,7 +7242,7 @@
           <p:cNvPr id="25" name="Group 24">
             <a:extLst>
               <a:ext uri="{FF2B5EF4-FFF2-40B4-BE49-F238E27FC236}">
-                <a16:creationId xmlns:a16="http://schemas.microsoft.com/office/drawing/2014/main" id="{2C952F41-27A7-9C32-808C-477905DA867C}"/>
+                <a16:creationId xmlns:a16="http://schemas.microsoft.com/office/drawing/2014/main" xmlns="" id="{2C952F41-27A7-9C32-808C-477905DA867C}"/>
               </a:ext>
             </a:extLst>
           </p:cNvPr>
@@ -7204,7 +7251,7 @@
         </p:nvGrpSpPr>
         <p:grpSpPr>
           <a:xfrm>
-            <a:off x="270274" y="8458579"/>
+            <a:off x="329507" y="8466411"/>
             <a:ext cx="1868546" cy="1607986"/>
             <a:chOff x="2632648" y="4648872"/>
             <a:chExt cx="1656184" cy="3999629"/>
@@ -7215,7 +7262,7 @@
             <p:cNvPr id="26" name="Rectangle 25">
               <a:extLst>
                 <a:ext uri="{FF2B5EF4-FFF2-40B4-BE49-F238E27FC236}">
-                  <a16:creationId xmlns:a16="http://schemas.microsoft.com/office/drawing/2014/main" id="{069B421E-E6CB-50E0-DE25-4F7ECC759391}"/>
+                  <a16:creationId xmlns:a16="http://schemas.microsoft.com/office/drawing/2014/main" xmlns="" id="{069B421E-E6CB-50E0-DE25-4F7ECC759391}"/>
                 </a:ext>
               </a:extLst>
             </p:cNvPr>
@@ -7299,7 +7346,7 @@
             <p:cNvPr id="27" name="Rectangle 26">
               <a:extLst>
                 <a:ext uri="{FF2B5EF4-FFF2-40B4-BE49-F238E27FC236}">
-                  <a16:creationId xmlns:a16="http://schemas.microsoft.com/office/drawing/2014/main" id="{00B894C3-DEFE-58FB-6686-56046A9B2E82}"/>
+                  <a16:creationId xmlns:a16="http://schemas.microsoft.com/office/drawing/2014/main" xmlns="" id="{00B894C3-DEFE-58FB-6686-56046A9B2E82}"/>
                 </a:ext>
               </a:extLst>
             </p:cNvPr>
@@ -7361,121 +7408,12 @@
           </p:txBody>
         </p:sp>
       </p:grpSp>
-      <p:sp>
-        <p:nvSpPr>
-          <p:cNvPr id="28" name="Rectangle 27">
-            <a:extLst>
-              <a:ext uri="{FF2B5EF4-FFF2-40B4-BE49-F238E27FC236}">
-                <a16:creationId xmlns:a16="http://schemas.microsoft.com/office/drawing/2014/main" id="{13258678-B578-DC50-B985-7A4E3E827BB9}"/>
-              </a:ext>
-            </a:extLst>
-          </p:cNvPr>
-          <p:cNvSpPr/>
-          <p:nvPr/>
-        </p:nvSpPr>
-        <p:spPr>
-          <a:xfrm>
-            <a:off x="270274" y="11202715"/>
-            <a:ext cx="1868546" cy="936104"/>
-          </a:xfrm>
-          <a:prstGeom prst="rect">
-            <a:avLst/>
-          </a:prstGeom>
-          <a:solidFill>
-            <a:schemeClr val="bg1"/>
-          </a:solidFill>
-          <a:ln w="19050">
-            <a:solidFill>
-              <a:schemeClr val="tx1"/>
-            </a:solidFill>
-          </a:ln>
-        </p:spPr>
-        <p:style>
-          <a:lnRef idx="2">
-            <a:schemeClr val="accent1">
-              <a:shade val="50000"/>
-            </a:schemeClr>
-          </a:lnRef>
-          <a:fillRef idx="1">
-            <a:schemeClr val="accent1"/>
-          </a:fillRef>
-          <a:effectRef idx="0">
-            <a:schemeClr val="accent1"/>
-          </a:effectRef>
-          <a:fontRef idx="minor">
-            <a:schemeClr val="lt1"/>
-          </a:fontRef>
-        </p:style>
-        <p:txBody>
-          <a:bodyPr lIns="40616" tIns="40616" rIns="40616" bIns="40616" rtlCol="0" anchor="t"/>
-          <a:lstStyle/>
-          <a:p>
-            <a:r>
-              <a:rPr lang="ko-KR" altLang="en-US" sz="1200" dirty="0">
-                <a:solidFill>
-                  <a:schemeClr val="tx1"/>
-                </a:solidFill>
-              </a:rPr>
-              <a:t>음영 표기 참고 사항</a:t>
-            </a:r>
-            <a:r>
-              <a:rPr lang="en-US" altLang="ko-KR" sz="1200" dirty="0">
-                <a:solidFill>
-                  <a:schemeClr val="tx1"/>
-                </a:solidFill>
-              </a:rPr>
-              <a:t>:</a:t>
-            </a:r>
-          </a:p>
-          <a:p>
-            <a:endParaRPr lang="en-US" altLang="ko-KR" sz="1200" dirty="0">
-              <a:solidFill>
-                <a:schemeClr val="tx1"/>
-              </a:solidFill>
-            </a:endParaRPr>
-          </a:p>
-          <a:p>
-            <a:r>
-              <a:rPr lang="en-US" altLang="ko-KR" sz="1200" dirty="0">
-                <a:solidFill>
-                  <a:schemeClr val="tx1"/>
-                </a:solidFill>
-                <a:highlight>
-                  <a:srgbClr val="00FF00"/>
-                </a:highlight>
-              </a:rPr>
-              <a:t>select</a:t>
-            </a:r>
-          </a:p>
-          <a:p>
-            <a:r>
-              <a:rPr lang="en-US" altLang="ko-KR" sz="1200" dirty="0" err="1">
-                <a:solidFill>
-                  <a:schemeClr val="tx1"/>
-                </a:solidFill>
-                <a:highlight>
-                  <a:srgbClr val="FFFF00"/>
-                </a:highlight>
-              </a:rPr>
-              <a:t>orderby</a:t>
-            </a:r>
-            <a:endParaRPr lang="en-US" altLang="ko-KR" sz="1200" dirty="0">
-              <a:solidFill>
-                <a:schemeClr val="tx1"/>
-              </a:solidFill>
-              <a:highlight>
-                <a:srgbClr val="FFFF00"/>
-              </a:highlight>
-            </a:endParaRPr>
-          </a:p>
-        </p:txBody>
-      </p:sp>
       <p:grpSp>
         <p:nvGrpSpPr>
           <p:cNvPr id="29" name="Group 28">
             <a:extLst>
               <a:ext uri="{FF2B5EF4-FFF2-40B4-BE49-F238E27FC236}">
-                <a16:creationId xmlns:a16="http://schemas.microsoft.com/office/drawing/2014/main" id="{C412169C-963F-2F4F-6A31-31252F699B58}"/>
+                <a16:creationId xmlns:a16="http://schemas.microsoft.com/office/drawing/2014/main" xmlns="" id="{C412169C-963F-2F4F-6A31-31252F699B58}"/>
               </a:ext>
             </a:extLst>
           </p:cNvPr>
@@ -7484,7 +7422,7 @@
         </p:nvGrpSpPr>
         <p:grpSpPr>
           <a:xfrm>
-            <a:off x="2377296" y="8494572"/>
+            <a:off x="2345731" y="8466411"/>
             <a:ext cx="1868546" cy="1607986"/>
             <a:chOff x="2632648" y="4648872"/>
             <a:chExt cx="1656184" cy="3999629"/>
@@ -7495,7 +7433,7 @@
             <p:cNvPr id="30" name="Rectangle 29">
               <a:extLst>
                 <a:ext uri="{FF2B5EF4-FFF2-40B4-BE49-F238E27FC236}">
-                  <a16:creationId xmlns:a16="http://schemas.microsoft.com/office/drawing/2014/main" id="{547586FD-A15D-6A74-9F61-9698A0E0C016}"/>
+                  <a16:creationId xmlns:a16="http://schemas.microsoft.com/office/drawing/2014/main" xmlns="" id="{547586FD-A15D-6A74-9F61-9698A0E0C016}"/>
                 </a:ext>
               </a:extLst>
             </p:cNvPr>
@@ -7596,7 +7534,7 @@
             <p:cNvPr id="31" name="Rectangle 30">
               <a:extLst>
                 <a:ext uri="{FF2B5EF4-FFF2-40B4-BE49-F238E27FC236}">
-                  <a16:creationId xmlns:a16="http://schemas.microsoft.com/office/drawing/2014/main" id="{2DE60EB0-E6CA-BB29-A7D0-48D8387AA20D}"/>
+                  <a16:creationId xmlns:a16="http://schemas.microsoft.com/office/drawing/2014/main" xmlns="" id="{2DE60EB0-E6CA-BB29-A7D0-48D8387AA20D}"/>
                 </a:ext>
               </a:extLst>
             </p:cNvPr>
@@ -7663,7 +7601,7 @@
           <p:cNvPr id="224" name="Group 223">
             <a:extLst>
               <a:ext uri="{FF2B5EF4-FFF2-40B4-BE49-F238E27FC236}">
-                <a16:creationId xmlns:a16="http://schemas.microsoft.com/office/drawing/2014/main" id="{BEE959DC-2C82-453B-011B-906CF7EA1E11}"/>
+                <a16:creationId xmlns:a16="http://schemas.microsoft.com/office/drawing/2014/main" xmlns="" id="{BEE959DC-2C82-453B-011B-906CF7EA1E11}"/>
               </a:ext>
             </a:extLst>
           </p:cNvPr>
@@ -7672,7 +7610,7 @@
         </p:nvGrpSpPr>
         <p:grpSpPr>
           <a:xfrm>
-            <a:off x="2377296" y="6655189"/>
+            <a:off x="2345731" y="6666211"/>
             <a:ext cx="1868546" cy="1607986"/>
             <a:chOff x="2632648" y="4648872"/>
             <a:chExt cx="1656184" cy="3999629"/>
@@ -7683,7 +7621,7 @@
             <p:cNvPr id="225" name="Rectangle 224">
               <a:extLst>
                 <a:ext uri="{FF2B5EF4-FFF2-40B4-BE49-F238E27FC236}">
-                  <a16:creationId xmlns:a16="http://schemas.microsoft.com/office/drawing/2014/main" id="{5A647213-A7C7-C1B4-ECF9-4B22E4CB7E06}"/>
+                  <a16:creationId xmlns:a16="http://schemas.microsoft.com/office/drawing/2014/main" xmlns="" id="{5A647213-A7C7-C1B4-ECF9-4B22E4CB7E06}"/>
                 </a:ext>
               </a:extLst>
             </p:cNvPr>
@@ -7751,7 +7689,7 @@
             <p:cNvPr id="226" name="Rectangle 225">
               <a:extLst>
                 <a:ext uri="{FF2B5EF4-FFF2-40B4-BE49-F238E27FC236}">
-                  <a16:creationId xmlns:a16="http://schemas.microsoft.com/office/drawing/2014/main" id="{1EE240E6-F1AB-79AE-AF0A-603C37F56955}"/>
+                  <a16:creationId xmlns:a16="http://schemas.microsoft.com/office/drawing/2014/main" xmlns="" id="{1EE240E6-F1AB-79AE-AF0A-603C37F56955}"/>
                 </a:ext>
               </a:extLst>
             </p:cNvPr>
@@ -7821,6 +7759,1128 @@
           </p:txBody>
         </p:sp>
       </p:grpSp>
+      <p:grpSp>
+        <p:nvGrpSpPr>
+          <p:cNvPr id="72" name="Group 71">
+            <a:extLst>
+              <a:ext uri="{FF2B5EF4-FFF2-40B4-BE49-F238E27FC236}">
+                <a16:creationId xmlns:a16="http://schemas.microsoft.com/office/drawing/2014/main" xmlns="" id="{198CF282-3028-58DF-8FFC-C5EF6D11740A}"/>
+              </a:ext>
+            </a:extLst>
+          </p:cNvPr>
+          <p:cNvGrpSpPr/>
+          <p:nvPr/>
+        </p:nvGrpSpPr>
+        <p:grpSpPr>
+          <a:xfrm>
+            <a:off x="5658099" y="9330507"/>
+            <a:ext cx="1868546" cy="2319683"/>
+            <a:chOff x="2632648" y="4648872"/>
+            <a:chExt cx="1656184" cy="3999629"/>
+          </a:xfrm>
+        </p:grpSpPr>
+        <p:sp>
+          <p:nvSpPr>
+            <p:cNvPr id="73" name="Rectangle 72">
+              <a:extLst>
+                <a:ext uri="{FF2B5EF4-FFF2-40B4-BE49-F238E27FC236}">
+                  <a16:creationId xmlns:a16="http://schemas.microsoft.com/office/drawing/2014/main" xmlns="" id="{E50A1385-EACB-252B-0BD5-081B90AA28F9}"/>
+                </a:ext>
+              </a:extLst>
+            </p:cNvPr>
+            <p:cNvSpPr/>
+            <p:nvPr/>
+          </p:nvSpPr>
+          <p:spPr>
+            <a:xfrm>
+              <a:off x="2632648" y="5047945"/>
+              <a:ext cx="1656184" cy="3600556"/>
+            </a:xfrm>
+            <a:prstGeom prst="rect">
+              <a:avLst/>
+            </a:prstGeom>
+            <a:solidFill>
+              <a:schemeClr val="bg1"/>
+            </a:solidFill>
+            <a:ln w="19050">
+              <a:solidFill>
+                <a:schemeClr val="tx1"/>
+              </a:solidFill>
+            </a:ln>
+          </p:spPr>
+          <p:style>
+            <a:lnRef idx="2">
+              <a:schemeClr val="accent1">
+                <a:shade val="50000"/>
+              </a:schemeClr>
+            </a:lnRef>
+            <a:fillRef idx="1">
+              <a:schemeClr val="accent1"/>
+            </a:fillRef>
+            <a:effectRef idx="0">
+              <a:schemeClr val="accent1"/>
+            </a:effectRef>
+            <a:fontRef idx="minor">
+              <a:schemeClr val="lt1"/>
+            </a:fontRef>
+          </p:style>
+          <p:txBody>
+            <a:bodyPr lIns="40616" tIns="40616" rIns="40616" bIns="40616" rtlCol="0" anchor="t"/>
+            <a:lstStyle/>
+            <a:p>
+              <a:r>
+                <a:rPr lang="en-US" altLang="ko-KR" sz="1200" dirty="0" err="1" smtClean="0">
+                  <a:solidFill>
+                    <a:schemeClr val="tx1"/>
+                  </a:solidFill>
+                </a:rPr>
+                <a:t>parent_serial</a:t>
+              </a:r>
+              <a:endParaRPr lang="en-US" altLang="ko-KR" sz="1200" dirty="0" smtClean="0">
+                <a:solidFill>
+                  <a:schemeClr val="tx1"/>
+                </a:solidFill>
+              </a:endParaRPr>
+            </a:p>
+            <a:p>
+              <a:r>
+                <a:rPr lang="en-US" altLang="ko-KR" sz="1200" dirty="0" err="1" smtClean="0">
+                  <a:solidFill>
+                    <a:schemeClr val="tx1"/>
+                  </a:solidFill>
+                </a:rPr>
+                <a:t>parent_path</a:t>
+              </a:r>
+              <a:endParaRPr lang="en-US" altLang="ko-KR" sz="1200" dirty="0" smtClean="0">
+                <a:solidFill>
+                  <a:schemeClr val="tx1"/>
+                </a:solidFill>
+              </a:endParaRPr>
+            </a:p>
+            <a:p>
+              <a:r>
+                <a:rPr lang="en-US" altLang="ko-KR" sz="1200" dirty="0" smtClean="0">
+                  <a:solidFill>
+                    <a:schemeClr val="tx1"/>
+                  </a:solidFill>
+                </a:rPr>
+                <a:t>type</a:t>
+              </a:r>
+              <a:endParaRPr lang="en-US" altLang="ko-KR" sz="1200" dirty="0">
+                <a:solidFill>
+                  <a:schemeClr val="tx1"/>
+                </a:solidFill>
+              </a:endParaRPr>
+            </a:p>
+            <a:p>
+              <a:r>
+                <a:rPr lang="en-US" altLang="ko-KR" sz="1200" dirty="0" err="1">
+                  <a:solidFill>
+                    <a:schemeClr val="tx1"/>
+                  </a:solidFill>
+                </a:rPr>
+                <a:t>file_name</a:t>
+              </a:r>
+              <a:endParaRPr lang="en-US" altLang="ko-KR" sz="1200" dirty="0">
+                <a:solidFill>
+                  <a:schemeClr val="tx1"/>
+                </a:solidFill>
+              </a:endParaRPr>
+            </a:p>
+            <a:p>
+              <a:r>
+                <a:rPr lang="en-US" altLang="ko-KR" sz="1200" u="sng" dirty="0" err="1">
+                  <a:solidFill>
+                    <a:schemeClr val="tx1"/>
+                  </a:solidFill>
+                </a:rPr>
+                <a:t>file_serial</a:t>
+              </a:r>
+              <a:endParaRPr lang="en-US" altLang="ko-KR" sz="1200" dirty="0">
+                <a:solidFill>
+                  <a:schemeClr val="tx1"/>
+                </a:solidFill>
+              </a:endParaRPr>
+            </a:p>
+            <a:p>
+              <a:r>
+                <a:rPr lang="en-US" altLang="ko-KR" sz="1200" dirty="0" err="1">
+                  <a:solidFill>
+                    <a:schemeClr val="tx1"/>
+                  </a:solidFill>
+                </a:rPr>
+                <a:t>last_renamed</a:t>
+              </a:r>
+              <a:endParaRPr lang="en-US" altLang="ko-KR" sz="1200" dirty="0">
+                <a:solidFill>
+                  <a:schemeClr val="tx1"/>
+                </a:solidFill>
+              </a:endParaRPr>
+            </a:p>
+            <a:p>
+              <a:r>
+                <a:rPr lang="en-US" altLang="ko-KR" sz="1200" dirty="0" err="1" smtClean="0">
+                  <a:solidFill>
+                    <a:schemeClr val="tx1"/>
+                  </a:solidFill>
+                </a:rPr>
+                <a:t>last_modified</a:t>
+              </a:r>
+              <a:endParaRPr lang="en-US" altLang="ko-KR" sz="1200" dirty="0" smtClean="0">
+                <a:solidFill>
+                  <a:schemeClr val="tx1"/>
+                </a:solidFill>
+              </a:endParaRPr>
+            </a:p>
+            <a:p>
+              <a:r>
+                <a:rPr lang="en-US" altLang="ko-KR" sz="1200" dirty="0" err="1" smtClean="0">
+                  <a:solidFill>
+                    <a:schemeClr val="tx1"/>
+                  </a:solidFill>
+                </a:rPr>
+                <a:t>del_type</a:t>
+              </a:r>
+              <a:endParaRPr lang="en-US" altLang="ko-KR" sz="1200" dirty="0" smtClean="0">
+                <a:solidFill>
+                  <a:schemeClr val="tx1"/>
+                </a:solidFill>
+              </a:endParaRPr>
+            </a:p>
+            <a:p>
+              <a:r>
+                <a:rPr lang="en-US" altLang="ko-KR" sz="1200" dirty="0" err="1" smtClean="0">
+                  <a:solidFill>
+                    <a:schemeClr val="tx1"/>
+                  </a:solidFill>
+                </a:rPr>
+                <a:t>to_restore</a:t>
+              </a:r>
+              <a:endParaRPr lang="en-US" altLang="ko-KR" sz="1200" dirty="0" smtClean="0">
+                <a:solidFill>
+                  <a:schemeClr val="tx1"/>
+                </a:solidFill>
+              </a:endParaRPr>
+            </a:p>
+            <a:p>
+              <a:r>
+                <a:rPr lang="en-US" altLang="ko-KR" sz="1200" dirty="0" err="1" smtClean="0">
+                  <a:solidFill>
+                    <a:schemeClr val="tx1"/>
+                  </a:solidFill>
+                </a:rPr>
+                <a:t>to_delete</a:t>
+              </a:r>
+              <a:endParaRPr lang="en-US" altLang="ko-KR" sz="1200" dirty="0" smtClean="0">
+                <a:solidFill>
+                  <a:schemeClr val="tx1"/>
+                </a:solidFill>
+              </a:endParaRPr>
+            </a:p>
+            <a:p>
+              <a:r>
+                <a:rPr lang="en-US" altLang="ko-KR" sz="1200" dirty="0" smtClean="0">
+                  <a:solidFill>
+                    <a:schemeClr val="tx1"/>
+                  </a:solidFill>
+                </a:rPr>
+                <a:t>mark</a:t>
+              </a:r>
+              <a:endParaRPr lang="en-US" altLang="ko-KR" sz="1200" dirty="0">
+                <a:solidFill>
+                  <a:schemeClr val="tx1"/>
+                </a:solidFill>
+              </a:endParaRPr>
+            </a:p>
+          </p:txBody>
+        </p:sp>
+        <p:sp>
+          <p:nvSpPr>
+            <p:cNvPr id="75" name="Rectangle 74">
+              <a:extLst>
+                <a:ext uri="{FF2B5EF4-FFF2-40B4-BE49-F238E27FC236}">
+                  <a16:creationId xmlns:a16="http://schemas.microsoft.com/office/drawing/2014/main" xmlns="" id="{69CED1C1-C8A6-CD04-1372-8F76EF005063}"/>
+                </a:ext>
+              </a:extLst>
+            </p:cNvPr>
+            <p:cNvSpPr/>
+            <p:nvPr/>
+          </p:nvSpPr>
+          <p:spPr>
+            <a:xfrm>
+              <a:off x="2632648" y="4648872"/>
+              <a:ext cx="1656184" cy="399073"/>
+            </a:xfrm>
+            <a:prstGeom prst="rect">
+              <a:avLst/>
+            </a:prstGeom>
+            <a:solidFill>
+              <a:schemeClr val="bg1"/>
+            </a:solidFill>
+            <a:ln w="19050">
+              <a:solidFill>
+                <a:schemeClr val="tx1"/>
+              </a:solidFill>
+            </a:ln>
+          </p:spPr>
+          <p:style>
+            <a:lnRef idx="2">
+              <a:schemeClr val="accent1">
+                <a:shade val="50000"/>
+              </a:schemeClr>
+            </a:lnRef>
+            <a:fillRef idx="1">
+              <a:schemeClr val="accent1"/>
+            </a:fillRef>
+            <a:effectRef idx="0">
+              <a:schemeClr val="accent1"/>
+            </a:effectRef>
+            <a:fontRef idx="minor">
+              <a:schemeClr val="lt1"/>
+            </a:fontRef>
+          </p:style>
+          <p:txBody>
+            <a:bodyPr lIns="0" tIns="0" rIns="0" bIns="0" rtlCol="0" anchor="ctr"/>
+            <a:lstStyle/>
+            <a:p>
+              <a:pPr algn="ctr"/>
+              <a:r>
+                <a:rPr lang="en-US" altLang="ko-KR" sz="1200" dirty="0" smtClean="0">
+                  <a:solidFill>
+                    <a:schemeClr val="tx1"/>
+                  </a:solidFill>
+                </a:rPr>
+                <a:t>recycle</a:t>
+              </a:r>
+              <a:endParaRPr lang="ko-KR" altLang="en-US" sz="1200" dirty="0">
+                <a:solidFill>
+                  <a:schemeClr val="tx1"/>
+                </a:solidFill>
+              </a:endParaRPr>
+            </a:p>
+          </p:txBody>
+        </p:sp>
+      </p:grpSp>
+      <p:cxnSp>
+        <p:nvCxnSpPr>
+          <p:cNvPr id="76" name="Straight Arrow Connector 75">
+            <a:extLst>
+              <a:ext uri="{FF2B5EF4-FFF2-40B4-BE49-F238E27FC236}">
+                <a16:creationId xmlns:a16="http://schemas.microsoft.com/office/drawing/2014/main" xmlns="" id="{7F732747-9B1E-D5E0-A200-D6D99FF6F39A}"/>
+              </a:ext>
+            </a:extLst>
+          </p:cNvPr>
+          <p:cNvCxnSpPr>
+            <a:stCxn id="77" idx="0"/>
+            <a:endCxn id="5" idx="3"/>
+          </p:cNvCxnSpPr>
+          <p:nvPr/>
+        </p:nvCxnSpPr>
+        <p:spPr>
+          <a:xfrm flipH="1" flipV="1">
+            <a:off x="4214277" y="4378694"/>
+            <a:ext cx="1155790" cy="3367637"/>
+          </a:xfrm>
+          <a:prstGeom prst="straightConnector1">
+            <a:avLst/>
+          </a:prstGeom>
+          <a:ln w="38100">
+            <a:solidFill>
+              <a:schemeClr val="tx1"/>
+            </a:solidFill>
+            <a:tailEnd type="triangle"/>
+          </a:ln>
+        </p:spPr>
+        <p:style>
+          <a:lnRef idx="1">
+            <a:schemeClr val="accent1"/>
+          </a:lnRef>
+          <a:fillRef idx="0">
+            <a:schemeClr val="accent1"/>
+          </a:fillRef>
+          <a:effectRef idx="0">
+            <a:schemeClr val="accent1"/>
+          </a:effectRef>
+          <a:fontRef idx="minor">
+            <a:schemeClr val="tx1"/>
+          </a:fontRef>
+        </p:style>
+      </p:cxnSp>
+      <p:sp>
+        <p:nvSpPr>
+          <p:cNvPr id="77" name="Diamond 76">
+            <a:extLst>
+              <a:ext uri="{FF2B5EF4-FFF2-40B4-BE49-F238E27FC236}">
+                <a16:creationId xmlns:a16="http://schemas.microsoft.com/office/drawing/2014/main" xmlns="" id="{7EFB3C19-4634-394C-3F56-114316A58A5B}"/>
+              </a:ext>
+            </a:extLst>
+          </p:cNvPr>
+          <p:cNvSpPr/>
+          <p:nvPr/>
+        </p:nvSpPr>
+        <p:spPr>
+          <a:xfrm>
+            <a:off x="4505971" y="7746331"/>
+            <a:ext cx="1728192" cy="731170"/>
+          </a:xfrm>
+          <a:prstGeom prst="diamond">
+            <a:avLst/>
+          </a:prstGeom>
+          <a:solidFill>
+            <a:schemeClr val="bg1"/>
+          </a:solidFill>
+          <a:ln w="19050">
+            <a:solidFill>
+              <a:schemeClr val="tx1"/>
+            </a:solidFill>
+          </a:ln>
+        </p:spPr>
+        <p:style>
+          <a:lnRef idx="2">
+            <a:schemeClr val="accent1">
+              <a:shade val="50000"/>
+            </a:schemeClr>
+          </a:lnRef>
+          <a:fillRef idx="1">
+            <a:schemeClr val="accent1"/>
+          </a:fillRef>
+          <a:effectRef idx="0">
+            <a:schemeClr val="accent1"/>
+          </a:effectRef>
+          <a:fontRef idx="minor">
+            <a:schemeClr val="lt1"/>
+          </a:fontRef>
+        </p:style>
+        <p:txBody>
+          <a:bodyPr lIns="40616" tIns="40616" rIns="40616" bIns="40616" rtlCol="0" anchor="t"/>
+          <a:lstStyle/>
+          <a:p>
+            <a:pPr algn="ctr"/>
+            <a:r>
+              <a:rPr lang="en-US" altLang="ko-KR" sz="1200" dirty="0" err="1" smtClean="0">
+                <a:solidFill>
+                  <a:schemeClr val="tx1"/>
+                </a:solidFill>
+              </a:rPr>
+              <a:t>recycle_rel</a:t>
+            </a:r>
+            <a:endParaRPr lang="ko-KR" altLang="en-US" sz="1200" dirty="0" err="1">
+              <a:solidFill>
+                <a:schemeClr val="tx1"/>
+              </a:solidFill>
+            </a:endParaRPr>
+          </a:p>
+        </p:txBody>
+      </p:sp>
+      <p:cxnSp>
+        <p:nvCxnSpPr>
+          <p:cNvPr id="78" name="Straight Arrow Connector 77">
+            <a:extLst>
+              <a:ext uri="{FF2B5EF4-FFF2-40B4-BE49-F238E27FC236}">
+                <a16:creationId xmlns:a16="http://schemas.microsoft.com/office/drawing/2014/main" xmlns="" id="{E0727D1E-6978-BD9F-A7D5-8EE20798CB11}"/>
+              </a:ext>
+            </a:extLst>
+          </p:cNvPr>
+          <p:cNvCxnSpPr>
+            <a:cxnSpLocks/>
+            <a:stCxn id="77" idx="2"/>
+            <a:endCxn id="73" idx="1"/>
+          </p:cNvCxnSpPr>
+          <p:nvPr/>
+        </p:nvCxnSpPr>
+        <p:spPr>
+          <a:xfrm>
+            <a:off x="5370067" y="8477501"/>
+            <a:ext cx="288032" cy="2128574"/>
+          </a:xfrm>
+          <a:prstGeom prst="straightConnector1">
+            <a:avLst/>
+          </a:prstGeom>
+          <a:ln w="57150" cmpd="dbl">
+            <a:solidFill>
+              <a:schemeClr val="tx1"/>
+            </a:solidFill>
+            <a:tailEnd type="none"/>
+          </a:ln>
+        </p:spPr>
+        <p:style>
+          <a:lnRef idx="1">
+            <a:schemeClr val="accent1"/>
+          </a:lnRef>
+          <a:fillRef idx="0">
+            <a:schemeClr val="accent1"/>
+          </a:fillRef>
+          <a:effectRef idx="0">
+            <a:schemeClr val="accent1"/>
+          </a:effectRef>
+          <a:fontRef idx="minor">
+            <a:schemeClr val="tx1"/>
+          </a:fontRef>
+        </p:style>
+      </p:cxnSp>
+      <p:grpSp>
+        <p:nvGrpSpPr>
+          <p:cNvPr id="85" name="Group 84">
+            <a:extLst>
+              <a:ext uri="{FF2B5EF4-FFF2-40B4-BE49-F238E27FC236}">
+                <a16:creationId xmlns:a16="http://schemas.microsoft.com/office/drawing/2014/main" xmlns="" id="{C412169C-963F-2F4F-6A31-31252F699B58}"/>
+              </a:ext>
+            </a:extLst>
+          </p:cNvPr>
+          <p:cNvGrpSpPr/>
+          <p:nvPr/>
+        </p:nvGrpSpPr>
+        <p:grpSpPr>
+          <a:xfrm>
+            <a:off x="2345731" y="10266611"/>
+            <a:ext cx="1868546" cy="1607986"/>
+            <a:chOff x="2632648" y="4648872"/>
+            <a:chExt cx="1656184" cy="3999629"/>
+          </a:xfrm>
+        </p:grpSpPr>
+        <p:sp>
+          <p:nvSpPr>
+            <p:cNvPr id="86" name="Rectangle 85">
+              <a:extLst>
+                <a:ext uri="{FF2B5EF4-FFF2-40B4-BE49-F238E27FC236}">
+                  <a16:creationId xmlns:a16="http://schemas.microsoft.com/office/drawing/2014/main" xmlns="" id="{547586FD-A15D-6A74-9F61-9698A0E0C016}"/>
+                </a:ext>
+              </a:extLst>
+            </p:cNvPr>
+            <p:cNvSpPr/>
+            <p:nvPr/>
+          </p:nvSpPr>
+          <p:spPr>
+            <a:xfrm>
+              <a:off x="2632648" y="5259216"/>
+              <a:ext cx="1656184" cy="3389285"/>
+            </a:xfrm>
+            <a:prstGeom prst="rect">
+              <a:avLst/>
+            </a:prstGeom>
+            <a:solidFill>
+              <a:schemeClr val="bg1"/>
+            </a:solidFill>
+            <a:ln w="19050">
+              <a:solidFill>
+                <a:schemeClr val="tx1"/>
+              </a:solidFill>
+            </a:ln>
+          </p:spPr>
+          <p:style>
+            <a:lnRef idx="2">
+              <a:schemeClr val="accent1">
+                <a:shade val="50000"/>
+              </a:schemeClr>
+            </a:lnRef>
+            <a:fillRef idx="1">
+              <a:schemeClr val="accent1"/>
+            </a:fillRef>
+            <a:effectRef idx="0">
+              <a:schemeClr val="accent1"/>
+            </a:effectRef>
+            <a:fontRef idx="minor">
+              <a:schemeClr val="lt1"/>
+            </a:fontRef>
+          </p:style>
+          <p:txBody>
+            <a:bodyPr lIns="40616" tIns="40616" rIns="40616" bIns="40616" rtlCol="0" anchor="t"/>
+            <a:lstStyle/>
+            <a:p>
+              <a:r>
+                <a:rPr lang="en-US" altLang="ko-KR" sz="1200" u="sng" dirty="0" err="1" smtClean="0">
+                  <a:solidFill>
+                    <a:schemeClr val="tx1"/>
+                  </a:solidFill>
+                </a:rPr>
+                <a:t>file_serial</a:t>
+              </a:r>
+              <a:endParaRPr lang="en-US" altLang="ko-KR" sz="1200" u="sng" dirty="0" smtClean="0">
+                <a:solidFill>
+                  <a:schemeClr val="tx1"/>
+                </a:solidFill>
+              </a:endParaRPr>
+            </a:p>
+            <a:p>
+              <a:r>
+                <a:rPr lang="en-US" altLang="ko-KR" sz="1200" u="sng" dirty="0" smtClean="0">
+                  <a:solidFill>
+                    <a:schemeClr val="tx1"/>
+                  </a:solidFill>
+                </a:rPr>
+                <a:t>reader</a:t>
+              </a:r>
+              <a:endParaRPr lang="en-US" altLang="ko-KR" sz="1200" u="sng" dirty="0">
+                <a:solidFill>
+                  <a:schemeClr val="tx1"/>
+                </a:solidFill>
+              </a:endParaRPr>
+            </a:p>
+          </p:txBody>
+        </p:sp>
+        <p:sp>
+          <p:nvSpPr>
+            <p:cNvPr id="87" name="Rectangle 86">
+              <a:extLst>
+                <a:ext uri="{FF2B5EF4-FFF2-40B4-BE49-F238E27FC236}">
+                  <a16:creationId xmlns:a16="http://schemas.microsoft.com/office/drawing/2014/main" xmlns="" id="{2DE60EB0-E6CA-BB29-A7D0-48D8387AA20D}"/>
+                </a:ext>
+              </a:extLst>
+            </p:cNvPr>
+            <p:cNvSpPr/>
+            <p:nvPr/>
+          </p:nvSpPr>
+          <p:spPr>
+            <a:xfrm>
+              <a:off x="2632648" y="4648872"/>
+              <a:ext cx="1656184" cy="610347"/>
+            </a:xfrm>
+            <a:prstGeom prst="rect">
+              <a:avLst/>
+            </a:prstGeom>
+            <a:solidFill>
+              <a:schemeClr val="bg1"/>
+            </a:solidFill>
+            <a:ln w="19050">
+              <a:solidFill>
+                <a:schemeClr val="tx1"/>
+              </a:solidFill>
+            </a:ln>
+          </p:spPr>
+          <p:style>
+            <a:lnRef idx="2">
+              <a:schemeClr val="accent1">
+                <a:shade val="50000"/>
+              </a:schemeClr>
+            </a:lnRef>
+            <a:fillRef idx="1">
+              <a:schemeClr val="accent1"/>
+            </a:fillRef>
+            <a:effectRef idx="0">
+              <a:schemeClr val="accent1"/>
+            </a:effectRef>
+            <a:fontRef idx="minor">
+              <a:schemeClr val="lt1"/>
+            </a:fontRef>
+          </p:style>
+          <p:txBody>
+            <a:bodyPr lIns="0" tIns="0" rIns="0" bIns="0" rtlCol="0" anchor="ctr"/>
+            <a:lstStyle/>
+            <a:p>
+              <a:pPr algn="ctr"/>
+              <a:r>
+                <a:rPr lang="en-US" altLang="ko-KR" sz="1200" dirty="0" smtClean="0">
+                  <a:solidFill>
+                    <a:schemeClr val="tx1"/>
+                  </a:solidFill>
+                </a:rPr>
+                <a:t>bookmark &lt;view&gt;</a:t>
+              </a:r>
+              <a:endParaRPr lang="ko-KR" altLang="en-US" sz="1200" dirty="0">
+                <a:solidFill>
+                  <a:schemeClr val="tx1"/>
+                </a:solidFill>
+              </a:endParaRPr>
+            </a:p>
+          </p:txBody>
+        </p:sp>
+      </p:grpSp>
+      <p:grpSp>
+        <p:nvGrpSpPr>
+          <p:cNvPr id="88" name="Group 87">
+            <a:extLst>
+              <a:ext uri="{FF2B5EF4-FFF2-40B4-BE49-F238E27FC236}">
+                <a16:creationId xmlns:a16="http://schemas.microsoft.com/office/drawing/2014/main" xmlns="" id="{C412169C-963F-2F4F-6A31-31252F699B58}"/>
+              </a:ext>
+            </a:extLst>
+          </p:cNvPr>
+          <p:cNvGrpSpPr/>
+          <p:nvPr/>
+        </p:nvGrpSpPr>
+        <p:grpSpPr>
+          <a:xfrm>
+            <a:off x="8034363" y="2273723"/>
+            <a:ext cx="1868546" cy="1607986"/>
+            <a:chOff x="2632648" y="4648872"/>
+            <a:chExt cx="1656184" cy="3999629"/>
+          </a:xfrm>
+        </p:grpSpPr>
+        <p:sp>
+          <p:nvSpPr>
+            <p:cNvPr id="89" name="Rectangle 88">
+              <a:extLst>
+                <a:ext uri="{FF2B5EF4-FFF2-40B4-BE49-F238E27FC236}">
+                  <a16:creationId xmlns:a16="http://schemas.microsoft.com/office/drawing/2014/main" xmlns="" id="{547586FD-A15D-6A74-9F61-9698A0E0C016}"/>
+                </a:ext>
+              </a:extLst>
+            </p:cNvPr>
+            <p:cNvSpPr/>
+            <p:nvPr/>
+          </p:nvSpPr>
+          <p:spPr>
+            <a:xfrm>
+              <a:off x="2632648" y="5259216"/>
+              <a:ext cx="1656184" cy="3389285"/>
+            </a:xfrm>
+            <a:prstGeom prst="rect">
+              <a:avLst/>
+            </a:prstGeom>
+            <a:solidFill>
+              <a:schemeClr val="bg1"/>
+            </a:solidFill>
+            <a:ln w="38100" cmpd="dbl">
+              <a:solidFill>
+                <a:schemeClr val="tx1"/>
+              </a:solidFill>
+            </a:ln>
+          </p:spPr>
+          <p:style>
+            <a:lnRef idx="2">
+              <a:schemeClr val="accent1">
+                <a:shade val="50000"/>
+              </a:schemeClr>
+            </a:lnRef>
+            <a:fillRef idx="1">
+              <a:schemeClr val="accent1"/>
+            </a:fillRef>
+            <a:effectRef idx="0">
+              <a:schemeClr val="accent1"/>
+            </a:effectRef>
+            <a:fontRef idx="minor">
+              <a:schemeClr val="lt1"/>
+            </a:fontRef>
+          </p:style>
+          <p:txBody>
+            <a:bodyPr lIns="39600" tIns="39600" rIns="39600" bIns="39600" rtlCol="0" anchor="t"/>
+            <a:lstStyle/>
+            <a:p>
+              <a:r>
+                <a:rPr lang="en-US" altLang="ko-KR" sz="1200" dirty="0" err="1" smtClean="0">
+                  <a:solidFill>
+                    <a:schemeClr val="tx1"/>
+                  </a:solidFill>
+                </a:rPr>
+                <a:t>last_updated</a:t>
+              </a:r>
+              <a:endParaRPr lang="en-US" altLang="ko-KR" sz="1200" dirty="0">
+                <a:solidFill>
+                  <a:schemeClr val="tx1"/>
+                </a:solidFill>
+              </a:endParaRPr>
+            </a:p>
+          </p:txBody>
+        </p:sp>
+        <p:sp>
+          <p:nvSpPr>
+            <p:cNvPr id="91" name="Rectangle 90">
+              <a:extLst>
+                <a:ext uri="{FF2B5EF4-FFF2-40B4-BE49-F238E27FC236}">
+                  <a16:creationId xmlns:a16="http://schemas.microsoft.com/office/drawing/2014/main" xmlns="" id="{2DE60EB0-E6CA-BB29-A7D0-48D8387AA20D}"/>
+                </a:ext>
+              </a:extLst>
+            </p:cNvPr>
+            <p:cNvSpPr/>
+            <p:nvPr/>
+          </p:nvSpPr>
+          <p:spPr>
+            <a:xfrm>
+              <a:off x="2632648" y="4648872"/>
+              <a:ext cx="1656184" cy="610347"/>
+            </a:xfrm>
+            <a:prstGeom prst="rect">
+              <a:avLst/>
+            </a:prstGeom>
+            <a:solidFill>
+              <a:schemeClr val="bg1"/>
+            </a:solidFill>
+            <a:ln w="38100" cmpd="dbl">
+              <a:solidFill>
+                <a:schemeClr val="tx1"/>
+              </a:solidFill>
+            </a:ln>
+          </p:spPr>
+          <p:style>
+            <a:lnRef idx="2">
+              <a:schemeClr val="accent1">
+                <a:shade val="50000"/>
+              </a:schemeClr>
+            </a:lnRef>
+            <a:fillRef idx="1">
+              <a:schemeClr val="accent1"/>
+            </a:fillRef>
+            <a:effectRef idx="0">
+              <a:schemeClr val="accent1"/>
+            </a:effectRef>
+            <a:fontRef idx="minor">
+              <a:schemeClr val="lt1"/>
+            </a:fontRef>
+          </p:style>
+          <p:txBody>
+            <a:bodyPr lIns="39600" tIns="39600" rIns="39600" bIns="39600" rtlCol="0" anchor="ctr"/>
+            <a:lstStyle/>
+            <a:p>
+              <a:pPr algn="ctr"/>
+              <a:r>
+                <a:rPr lang="en-US" altLang="ko-KR" sz="1200" dirty="0" err="1" smtClean="0">
+                  <a:solidFill>
+                    <a:schemeClr val="tx1"/>
+                  </a:solidFill>
+                </a:rPr>
+                <a:t>friend_req</a:t>
+              </a:r>
+              <a:endParaRPr lang="ko-KR" altLang="en-US" sz="1200" dirty="0">
+                <a:solidFill>
+                  <a:schemeClr val="tx1"/>
+                </a:solidFill>
+              </a:endParaRPr>
+            </a:p>
+          </p:txBody>
+        </p:sp>
+      </p:grpSp>
+      <p:cxnSp>
+        <p:nvCxnSpPr>
+          <p:cNvPr id="113" name="Straight Arrow Connector 112">
+            <a:extLst>
+              <a:ext uri="{FF2B5EF4-FFF2-40B4-BE49-F238E27FC236}">
+                <a16:creationId xmlns:a16="http://schemas.microsoft.com/office/drawing/2014/main" xmlns="" id="{517B0F27-907E-9D76-80A2-16F164F866E9}"/>
+              </a:ext>
+            </a:extLst>
+          </p:cNvPr>
+          <p:cNvCxnSpPr>
+            <a:stCxn id="117" idx="1"/>
+            <a:endCxn id="5" idx="3"/>
+          </p:cNvCxnSpPr>
+          <p:nvPr/>
+        </p:nvCxnSpPr>
+        <p:spPr>
+          <a:xfrm flipH="1">
+            <a:off x="4214277" y="2063244"/>
+            <a:ext cx="939766" cy="2315450"/>
+          </a:xfrm>
+          <a:prstGeom prst="straightConnector1">
+            <a:avLst/>
+          </a:prstGeom>
+          <a:ln w="38100">
+            <a:solidFill>
+              <a:schemeClr val="tx1"/>
+            </a:solidFill>
+            <a:tailEnd type="triangle"/>
+          </a:ln>
+        </p:spPr>
+        <p:style>
+          <a:lnRef idx="1">
+            <a:schemeClr val="accent1"/>
+          </a:lnRef>
+          <a:fillRef idx="0">
+            <a:schemeClr val="accent1"/>
+          </a:fillRef>
+          <a:effectRef idx="0">
+            <a:schemeClr val="accent1"/>
+          </a:effectRef>
+          <a:fontRef idx="minor">
+            <a:schemeClr val="tx1"/>
+          </a:fontRef>
+        </p:style>
+      </p:cxnSp>
+      <p:sp>
+        <p:nvSpPr>
+          <p:cNvPr id="117" name="Diamond 116">
+            <a:extLst>
+              <a:ext uri="{FF2B5EF4-FFF2-40B4-BE49-F238E27FC236}">
+                <a16:creationId xmlns:a16="http://schemas.microsoft.com/office/drawing/2014/main" xmlns="" id="{D22792B0-A6C6-0534-EC8D-CB9B46912D22}"/>
+              </a:ext>
+            </a:extLst>
+          </p:cNvPr>
+          <p:cNvSpPr/>
+          <p:nvPr/>
+        </p:nvSpPr>
+        <p:spPr>
+          <a:xfrm>
+            <a:off x="5154043" y="1697659"/>
+            <a:ext cx="1543582" cy="731170"/>
+          </a:xfrm>
+          <a:prstGeom prst="diamond">
+            <a:avLst/>
+          </a:prstGeom>
+          <a:solidFill>
+            <a:schemeClr val="bg1"/>
+          </a:solidFill>
+          <a:ln w="38100" cmpd="dbl">
+            <a:solidFill>
+              <a:schemeClr val="tx1"/>
+            </a:solidFill>
+          </a:ln>
+        </p:spPr>
+        <p:style>
+          <a:lnRef idx="2">
+            <a:schemeClr val="accent1">
+              <a:shade val="50000"/>
+            </a:schemeClr>
+          </a:lnRef>
+          <a:fillRef idx="1">
+            <a:schemeClr val="accent1"/>
+          </a:fillRef>
+          <a:effectRef idx="0">
+            <a:schemeClr val="accent1"/>
+          </a:effectRef>
+          <a:fontRef idx="minor">
+            <a:schemeClr val="lt1"/>
+          </a:fontRef>
+        </p:style>
+        <p:txBody>
+          <a:bodyPr lIns="40616" tIns="40616" rIns="40616" bIns="40616" rtlCol="0" anchor="t"/>
+          <a:lstStyle/>
+          <a:p>
+            <a:pPr algn="ctr"/>
+            <a:r>
+              <a:rPr lang="en-US" altLang="ko-KR" sz="1200" dirty="0" smtClean="0">
+                <a:solidFill>
+                  <a:schemeClr val="tx1"/>
+                </a:solidFill>
+              </a:rPr>
+              <a:t>request_</a:t>
+            </a:r>
+            <a:endParaRPr lang="en-US" altLang="ko-KR" sz="1200" dirty="0">
+              <a:solidFill>
+                <a:schemeClr val="tx1"/>
+              </a:solidFill>
+            </a:endParaRPr>
+          </a:p>
+          <a:p>
+            <a:pPr algn="ctr"/>
+            <a:r>
+              <a:rPr lang="en-US" altLang="ko-KR" sz="1200" dirty="0" smtClean="0">
+                <a:solidFill>
+                  <a:schemeClr val="tx1"/>
+                </a:solidFill>
+              </a:rPr>
+              <a:t>from</a:t>
+            </a:r>
+            <a:endParaRPr lang="ko-KR" altLang="en-US" sz="1200" dirty="0" err="1">
+              <a:solidFill>
+                <a:schemeClr val="tx1"/>
+              </a:solidFill>
+            </a:endParaRPr>
+          </a:p>
+        </p:txBody>
+      </p:sp>
+      <p:cxnSp>
+        <p:nvCxnSpPr>
+          <p:cNvPr id="118" name="Straight Arrow Connector 117">
+            <a:extLst>
+              <a:ext uri="{FF2B5EF4-FFF2-40B4-BE49-F238E27FC236}">
+                <a16:creationId xmlns:a16="http://schemas.microsoft.com/office/drawing/2014/main" xmlns="" id="{2DB24178-E2A9-A5B3-3338-4C3E0B15A137}"/>
+              </a:ext>
+            </a:extLst>
+          </p:cNvPr>
+          <p:cNvCxnSpPr>
+            <a:stCxn id="117" idx="3"/>
+            <a:endCxn id="89" idx="1"/>
+          </p:cNvCxnSpPr>
+          <p:nvPr/>
+        </p:nvCxnSpPr>
+        <p:spPr>
+          <a:xfrm>
+            <a:off x="6697625" y="2063244"/>
+            <a:ext cx="1336738" cy="1137162"/>
+          </a:xfrm>
+          <a:prstGeom prst="straightConnector1">
+            <a:avLst/>
+          </a:prstGeom>
+          <a:ln w="57150" cmpd="dbl">
+            <a:solidFill>
+              <a:schemeClr val="tx1"/>
+            </a:solidFill>
+            <a:tailEnd type="triangle"/>
+          </a:ln>
+        </p:spPr>
+        <p:style>
+          <a:lnRef idx="1">
+            <a:schemeClr val="accent1"/>
+          </a:lnRef>
+          <a:fillRef idx="0">
+            <a:schemeClr val="accent1"/>
+          </a:fillRef>
+          <a:effectRef idx="0">
+            <a:schemeClr val="accent1"/>
+          </a:effectRef>
+          <a:fontRef idx="minor">
+            <a:schemeClr val="tx1"/>
+          </a:fontRef>
+        </p:style>
+      </p:cxnSp>
+      <p:cxnSp>
+        <p:nvCxnSpPr>
+          <p:cNvPr id="119" name="Straight Arrow Connector 118">
+            <a:extLst>
+              <a:ext uri="{FF2B5EF4-FFF2-40B4-BE49-F238E27FC236}">
+                <a16:creationId xmlns:a16="http://schemas.microsoft.com/office/drawing/2014/main" xmlns="" id="{517B0F27-907E-9D76-80A2-16F164F866E9}"/>
+              </a:ext>
+            </a:extLst>
+          </p:cNvPr>
+          <p:cNvCxnSpPr>
+            <a:stCxn id="120" idx="1"/>
+            <a:endCxn id="5" idx="3"/>
+          </p:cNvCxnSpPr>
+          <p:nvPr/>
+        </p:nvCxnSpPr>
+        <p:spPr>
+          <a:xfrm flipH="1">
+            <a:off x="4214277" y="2927340"/>
+            <a:ext cx="939766" cy="1451354"/>
+          </a:xfrm>
+          <a:prstGeom prst="straightConnector1">
+            <a:avLst/>
+          </a:prstGeom>
+          <a:ln w="38100">
+            <a:solidFill>
+              <a:schemeClr val="tx1"/>
+            </a:solidFill>
+            <a:tailEnd type="triangle"/>
+          </a:ln>
+        </p:spPr>
+        <p:style>
+          <a:lnRef idx="1">
+            <a:schemeClr val="accent1"/>
+          </a:lnRef>
+          <a:fillRef idx="0">
+            <a:schemeClr val="accent1"/>
+          </a:fillRef>
+          <a:effectRef idx="0">
+            <a:schemeClr val="accent1"/>
+          </a:effectRef>
+          <a:fontRef idx="minor">
+            <a:schemeClr val="tx1"/>
+          </a:fontRef>
+        </p:style>
+      </p:cxnSp>
+      <p:sp>
+        <p:nvSpPr>
+          <p:cNvPr id="120" name="Diamond 119">
+            <a:extLst>
+              <a:ext uri="{FF2B5EF4-FFF2-40B4-BE49-F238E27FC236}">
+                <a16:creationId xmlns:a16="http://schemas.microsoft.com/office/drawing/2014/main" xmlns="" id="{D22792B0-A6C6-0534-EC8D-CB9B46912D22}"/>
+              </a:ext>
+            </a:extLst>
+          </p:cNvPr>
+          <p:cNvSpPr/>
+          <p:nvPr/>
+        </p:nvSpPr>
+        <p:spPr>
+          <a:xfrm>
+            <a:off x="5154043" y="2561755"/>
+            <a:ext cx="1543582" cy="731170"/>
+          </a:xfrm>
+          <a:prstGeom prst="diamond">
+            <a:avLst/>
+          </a:prstGeom>
+          <a:solidFill>
+            <a:schemeClr val="bg1"/>
+          </a:solidFill>
+          <a:ln w="38100" cmpd="dbl">
+            <a:solidFill>
+              <a:schemeClr val="tx1"/>
+            </a:solidFill>
+          </a:ln>
+        </p:spPr>
+        <p:style>
+          <a:lnRef idx="2">
+            <a:schemeClr val="accent1">
+              <a:shade val="50000"/>
+            </a:schemeClr>
+          </a:lnRef>
+          <a:fillRef idx="1">
+            <a:schemeClr val="accent1"/>
+          </a:fillRef>
+          <a:effectRef idx="0">
+            <a:schemeClr val="accent1"/>
+          </a:effectRef>
+          <a:fontRef idx="minor">
+            <a:schemeClr val="lt1"/>
+          </a:fontRef>
+        </p:style>
+        <p:txBody>
+          <a:bodyPr lIns="40616" tIns="40616" rIns="40616" bIns="40616" rtlCol="0" anchor="t"/>
+          <a:lstStyle/>
+          <a:p>
+            <a:pPr algn="ctr"/>
+            <a:r>
+              <a:rPr lang="en-US" altLang="ko-KR" sz="1200" dirty="0" smtClean="0">
+                <a:solidFill>
+                  <a:schemeClr val="tx1"/>
+                </a:solidFill>
+              </a:rPr>
+              <a:t>request_</a:t>
+            </a:r>
+            <a:endParaRPr lang="en-US" altLang="ko-KR" sz="1200" dirty="0">
+              <a:solidFill>
+                <a:schemeClr val="tx1"/>
+              </a:solidFill>
+            </a:endParaRPr>
+          </a:p>
+          <a:p>
+            <a:pPr algn="ctr"/>
+            <a:r>
+              <a:rPr lang="en-US" altLang="ko-KR" sz="1200" dirty="0">
+                <a:solidFill>
+                  <a:schemeClr val="tx1"/>
+                </a:solidFill>
+              </a:rPr>
+              <a:t>to</a:t>
+            </a:r>
+            <a:endParaRPr lang="ko-KR" altLang="en-US" sz="1200" dirty="0" err="1">
+              <a:solidFill>
+                <a:schemeClr val="tx1"/>
+              </a:solidFill>
+            </a:endParaRPr>
+          </a:p>
+        </p:txBody>
+      </p:sp>
+      <p:cxnSp>
+        <p:nvCxnSpPr>
+          <p:cNvPr id="121" name="Straight Arrow Connector 120">
+            <a:extLst>
+              <a:ext uri="{FF2B5EF4-FFF2-40B4-BE49-F238E27FC236}">
+                <a16:creationId xmlns:a16="http://schemas.microsoft.com/office/drawing/2014/main" xmlns="" id="{2DB24178-E2A9-A5B3-3338-4C3E0B15A137}"/>
+              </a:ext>
+            </a:extLst>
+          </p:cNvPr>
+          <p:cNvCxnSpPr>
+            <a:stCxn id="120" idx="3"/>
+            <a:endCxn id="89" idx="1"/>
+          </p:cNvCxnSpPr>
+          <p:nvPr/>
+        </p:nvCxnSpPr>
+        <p:spPr>
+          <a:xfrm>
+            <a:off x="6697625" y="2927340"/>
+            <a:ext cx="1336738" cy="273066"/>
+          </a:xfrm>
+          <a:prstGeom prst="straightConnector1">
+            <a:avLst/>
+          </a:prstGeom>
+          <a:ln w="57150" cmpd="dbl">
+            <a:solidFill>
+              <a:schemeClr val="tx1"/>
+            </a:solidFill>
+            <a:tailEnd type="triangle"/>
+          </a:ln>
+        </p:spPr>
+        <p:style>
+          <a:lnRef idx="1">
+            <a:schemeClr val="accent1"/>
+          </a:lnRef>
+          <a:fillRef idx="0">
+            <a:schemeClr val="accent1"/>
+          </a:fillRef>
+          <a:effectRef idx="0">
+            <a:schemeClr val="accent1"/>
+          </a:effectRef>
+          <a:fontRef idx="minor">
+            <a:schemeClr val="tx1"/>
+          </a:fontRef>
+        </p:style>
+      </p:cxnSp>
     </p:spTree>
   </p:cSld>
   <p:clrMapOvr>
@@ -8155,7 +9215,7 @@
     </a:clrScheme>
     <a:fontScheme name="Office">
       <a:majorFont>
-        <a:latin typeface="맑은 고딕" panose="020F0302020204030204"/>
+        <a:latin typeface="맑은 고딕"/>
         <a:ea typeface=""/>
         <a:cs typeface=""/>
         <a:font script="Jpan" typeface="游ゴシック Light"/>
@@ -8207,7 +9267,7 @@
         <a:font script="Tfng" typeface="Ebrima"/>
       </a:majorFont>
       <a:minorFont>
-        <a:latin typeface="맑은 고딕" panose="020F0502020204030204"/>
+        <a:latin typeface="맑은 고딕"/>
         <a:ea typeface=""/>
         <a:cs typeface=""/>
         <a:font script="Jpan" typeface="游ゴシック"/>
@@ -8401,7 +9461,7 @@
   <a:extraClrSchemeLst/>
   <a:extLst>
     <a:ext uri="{05A4C25C-085E-4340-85A3-A5531E510DB2}">
-      <thm15:themeFamily xmlns:thm15="http://schemas.microsoft.com/office/thememl/2012/main" name="Office Theme" id="{62F939B6-93AF-4DB8-9C6B-D6C7DFDC589F}" vid="{4A3C46E8-61CC-4603-A589-7422A47A8E4A}"/>
+      <thm15:themeFamily xmlns:thm15="http://schemas.microsoft.com/office/thememl/2012/main" xmlns="" name="Office Theme" id="{62F939B6-93AF-4DB8-9C6B-D6C7DFDC589F}" vid="{4A3C46E8-61CC-4603-A589-7422A47A8E4A}"/>
     </a:ext>
   </a:extLst>
 </a:theme>

</xml_diff>

<commit_message>
fix nonroot file upload, readme under construction
- also clean up unused spec files for now
</commit_message>
<xml_diff>
--- a/READUS/reminder-web-er.pptx
+++ b/READUS/reminder-web-er.pptx
@@ -212,7 +212,7 @@
             <a:fld id="{5ADA11A1-5AD6-489A-9144-FC3497B7B873}" type="datetimeFigureOut">
               <a:rPr lang="ko-KR" altLang="en-US" smtClean="0"/>
               <a:pPr/>
-              <a:t>2025-12-23</a:t>
+              <a:t>2026-01-11</a:t>
             </a:fld>
             <a:endParaRPr lang="ko-KR" altLang="en-US"/>
           </a:p>
@@ -748,7 +748,7 @@
             <a:fld id="{D3633D0A-AEB7-4A32-B80E-995D605C0F6A}" type="datetimeFigureOut">
               <a:rPr lang="ko-KR" altLang="en-US" smtClean="0"/>
               <a:pPr/>
-              <a:t>2025-12-23</a:t>
+              <a:t>2026-01-11</a:t>
             </a:fld>
             <a:endParaRPr lang="ko-KR" altLang="en-US"/>
           </a:p>
@@ -915,7 +915,7 @@
             <a:fld id="{D3633D0A-AEB7-4A32-B80E-995D605C0F6A}" type="datetimeFigureOut">
               <a:rPr lang="ko-KR" altLang="en-US" smtClean="0"/>
               <a:pPr/>
-              <a:t>2025-12-23</a:t>
+              <a:t>2026-01-11</a:t>
             </a:fld>
             <a:endParaRPr lang="ko-KR" altLang="en-US"/>
           </a:p>
@@ -1092,7 +1092,7 @@
             <a:fld id="{D3633D0A-AEB7-4A32-B80E-995D605C0F6A}" type="datetimeFigureOut">
               <a:rPr lang="ko-KR" altLang="en-US" smtClean="0"/>
               <a:pPr/>
-              <a:t>2025-12-23</a:t>
+              <a:t>2026-01-11</a:t>
             </a:fld>
             <a:endParaRPr lang="ko-KR" altLang="en-US"/>
           </a:p>
@@ -1259,7 +1259,7 @@
             <a:fld id="{D3633D0A-AEB7-4A32-B80E-995D605C0F6A}" type="datetimeFigureOut">
               <a:rPr lang="ko-KR" altLang="en-US" smtClean="0"/>
               <a:pPr/>
-              <a:t>2025-12-23</a:t>
+              <a:t>2026-01-11</a:t>
             </a:fld>
             <a:endParaRPr lang="ko-KR" altLang="en-US"/>
           </a:p>
@@ -1502,7 +1502,7 @@
             <a:fld id="{D3633D0A-AEB7-4A32-B80E-995D605C0F6A}" type="datetimeFigureOut">
               <a:rPr lang="ko-KR" altLang="en-US" smtClean="0"/>
               <a:pPr/>
-              <a:t>2025-12-23</a:t>
+              <a:t>2026-01-11</a:t>
             </a:fld>
             <a:endParaRPr lang="ko-KR" altLang="en-US"/>
           </a:p>
@@ -1787,7 +1787,7 @@
             <a:fld id="{D3633D0A-AEB7-4A32-B80E-995D605C0F6A}" type="datetimeFigureOut">
               <a:rPr lang="ko-KR" altLang="en-US" smtClean="0"/>
               <a:pPr/>
-              <a:t>2025-12-23</a:t>
+              <a:t>2026-01-11</a:t>
             </a:fld>
             <a:endParaRPr lang="ko-KR" altLang="en-US"/>
           </a:p>
@@ -2206,7 +2206,7 @@
             <a:fld id="{D3633D0A-AEB7-4A32-B80E-995D605C0F6A}" type="datetimeFigureOut">
               <a:rPr lang="ko-KR" altLang="en-US" smtClean="0"/>
               <a:pPr/>
-              <a:t>2025-12-23</a:t>
+              <a:t>2026-01-11</a:t>
             </a:fld>
             <a:endParaRPr lang="ko-KR" altLang="en-US"/>
           </a:p>
@@ -2321,7 +2321,7 @@
             <a:fld id="{D3633D0A-AEB7-4A32-B80E-995D605C0F6A}" type="datetimeFigureOut">
               <a:rPr lang="ko-KR" altLang="en-US" smtClean="0"/>
               <a:pPr/>
-              <a:t>2025-12-23</a:t>
+              <a:t>2026-01-11</a:t>
             </a:fld>
             <a:endParaRPr lang="ko-KR" altLang="en-US"/>
           </a:p>
@@ -2413,7 +2413,7 @@
             <a:fld id="{D3633D0A-AEB7-4A32-B80E-995D605C0F6A}" type="datetimeFigureOut">
               <a:rPr lang="ko-KR" altLang="en-US" smtClean="0"/>
               <a:pPr/>
-              <a:t>2025-12-23</a:t>
+              <a:t>2026-01-11</a:t>
             </a:fld>
             <a:endParaRPr lang="ko-KR" altLang="en-US"/>
           </a:p>
@@ -2687,7 +2687,7 @@
             <a:fld id="{D3633D0A-AEB7-4A32-B80E-995D605C0F6A}" type="datetimeFigureOut">
               <a:rPr lang="ko-KR" altLang="en-US" smtClean="0"/>
               <a:pPr/>
-              <a:t>2025-12-23</a:t>
+              <a:t>2026-01-11</a:t>
             </a:fld>
             <a:endParaRPr lang="ko-KR" altLang="en-US"/>
           </a:p>
@@ -2937,7 +2937,7 @@
             <a:fld id="{D3633D0A-AEB7-4A32-B80E-995D605C0F6A}" type="datetimeFigureOut">
               <a:rPr lang="ko-KR" altLang="en-US" smtClean="0"/>
               <a:pPr/>
-              <a:t>2025-12-23</a:t>
+              <a:t>2026-01-11</a:t>
             </a:fld>
             <a:endParaRPr lang="ko-KR" altLang="en-US"/>
           </a:p>
@@ -3147,7 +3147,7 @@
             <a:fld id="{D3633D0A-AEB7-4A32-B80E-995D605C0F6A}" type="datetimeFigureOut">
               <a:rPr lang="ko-KR" altLang="en-US" smtClean="0"/>
               <a:pPr/>
-              <a:t>2025-12-23</a:t>
+              <a:t>2026-01-11</a:t>
             </a:fld>
             <a:endParaRPr lang="ko-KR" altLang="en-US"/>
           </a:p>
@@ -3595,9 +3595,6 @@
                   <a:solidFill>
                     <a:schemeClr val="tx1"/>
                   </a:solidFill>
-                  <a:highlight>
-                    <a:srgbClr val="00FF00"/>
-                  </a:highlight>
                 </a:rPr>
                 <a:t>user_id</a:t>
               </a:r>
@@ -3605,9 +3602,6 @@
                 <a:solidFill>
                   <a:schemeClr val="tx1"/>
                 </a:solidFill>
-                <a:highlight>
-                  <a:srgbClr val="00FF00"/>
-                </a:highlight>
               </a:endParaRPr>
             </a:p>
             <a:p>
@@ -4135,9 +4129,6 @@
                   <a:solidFill>
                     <a:schemeClr val="tx1"/>
                   </a:solidFill>
-                  <a:highlight>
-                    <a:srgbClr val="00FF00"/>
-                  </a:highlight>
                 </a:rPr>
                 <a:t>google_id</a:t>
               </a:r>
@@ -4145,9 +4136,6 @@
                 <a:solidFill>
                   <a:schemeClr val="tx1"/>
                 </a:solidFill>
-                <a:highlight>
-                  <a:srgbClr val="00FF00"/>
-                </a:highlight>
               </a:endParaRPr>
             </a:p>
             <a:p>
@@ -6815,9 +6803,6 @@
                   <a:solidFill>
                     <a:schemeClr val="tx1"/>
                   </a:solidFill>
-                  <a:highlight>
-                    <a:srgbClr val="00FF00"/>
-                  </a:highlight>
                 </a:rPr>
                 <a:t>user_id</a:t>
               </a:r>
@@ -6825,9 +6810,6 @@
                 <a:solidFill>
                   <a:schemeClr val="tx1"/>
                 </a:solidFill>
-                <a:highlight>
-                  <a:srgbClr val="00FF00"/>
-                </a:highlight>
               </a:endParaRPr>
             </a:p>
             <a:p>
@@ -7018,9 +7000,6 @@
                   <a:solidFill>
                     <a:schemeClr val="tx1"/>
                   </a:solidFill>
-                  <a:highlight>
-                    <a:srgbClr val="00FF00"/>
-                  </a:highlight>
                 </a:rPr>
                 <a:t>token</a:t>
               </a:r>
@@ -7326,9 +7305,6 @@
                   <a:solidFill>
                     <a:schemeClr val="tx1"/>
                   </a:solidFill>
-                  <a:highlight>
-                    <a:srgbClr val="00FF00"/>
-                  </a:highlight>
                 </a:rPr>
                 <a:t>token</a:t>
               </a:r>
@@ -7339,9 +7315,6 @@
                   <a:solidFill>
                     <a:schemeClr val="tx1"/>
                   </a:solidFill>
-                  <a:highlight>
-                    <a:srgbClr val="FFFF00"/>
-                  </a:highlight>
                 </a:rPr>
                 <a:t>last_updated</a:t>
               </a:r>
@@ -7349,9 +7322,6 @@
                 <a:solidFill>
                   <a:schemeClr val="tx1"/>
                 </a:solidFill>
-                <a:highlight>
-                  <a:srgbClr val="FFFF00"/>
-                </a:highlight>
               </a:endParaRPr>
             </a:p>
           </p:txBody>
@@ -7497,9 +7467,6 @@
                   <a:solidFill>
                     <a:schemeClr val="tx1"/>
                   </a:solidFill>
-                  <a:highlight>
-                    <a:srgbClr val="00FF00"/>
-                  </a:highlight>
                 </a:rPr>
                 <a:t>email</a:t>
               </a:r>
@@ -7510,9 +7477,6 @@
                   <a:solidFill>
                     <a:schemeClr val="tx1"/>
                   </a:solidFill>
-                  <a:highlight>
-                    <a:srgbClr val="00FF00"/>
-                  </a:highlight>
                 </a:rPr>
                 <a:t>email2</a:t>
               </a:r>
@@ -7685,9 +7649,6 @@
                   <a:solidFill>
                     <a:schemeClr val="tx1"/>
                   </a:solidFill>
-                  <a:highlight>
-                    <a:srgbClr val="00FF00"/>
-                  </a:highlight>
                 </a:rPr>
                 <a:t>user_id</a:t>
               </a:r>

</xml_diff>